<commit_message>
correções notebook + guião
</commit_message>
<xml_diff>
--- a/apresentacao_grupo01.pptx
+++ b/apresentacao_grupo01.pptx
@@ -4,6 +4,9 @@
   <p:sldMasterIdLst>
     <p:sldMasterId id="2147483648" r:id="rId1"/>
   </p:sldMasterIdLst>
+  <p:notesMasterIdLst>
+    <p:notesMasterId r:id="rId16"/>
+  </p:notesMasterIdLst>
   <p:sldIdLst>
     <p:sldId id="256" r:id="rId2"/>
     <p:sldId id="257" r:id="rId3"/>
@@ -475,6 +478,1877 @@
 </pc:chgInfo>
 </file>
 
+<file path=ppt/notesMasters/notesMaster1.xml><?xml version="1.0" encoding="utf-8"?>
+<p:notesMaster xmlns:a="http://schemas.openxmlformats.org/drawingml/2006/main" xmlns:r="http://schemas.openxmlformats.org/officeDocument/2006/relationships" xmlns:p="http://schemas.openxmlformats.org/presentationml/2006/main">
+  <p:cSld>
+    <p:bg>
+      <p:bgRef idx="1001">
+        <a:schemeClr val="bg1"/>
+      </p:bgRef>
+    </p:bg>
+    <p:spTree>
+      <p:nvGrpSpPr>
+        <p:cNvPr id="1" name=""/>
+        <p:cNvGrpSpPr/>
+        <p:nvPr/>
+      </p:nvGrpSpPr>
+      <p:grpSpPr>
+        <a:xfrm>
+          <a:off x="0" y="0"/>
+          <a:ext cx="0" cy="0"/>
+          <a:chOff x="0" y="0"/>
+          <a:chExt cx="0" cy="0"/>
+        </a:xfrm>
+      </p:grpSpPr>
+      <p:sp>
+        <p:nvSpPr>
+          <p:cNvPr id="2" name="Marcador de Posição do Cabeçalho 1"/>
+          <p:cNvSpPr>
+            <a:spLocks noGrp="1"/>
+          </p:cNvSpPr>
+          <p:nvPr>
+            <p:ph type="hdr" sz="quarter"/>
+          </p:nvPr>
+        </p:nvSpPr>
+        <p:spPr>
+          <a:xfrm>
+            <a:off x="0" y="0"/>
+            <a:ext cx="2971800" cy="458788"/>
+          </a:xfrm>
+          <a:prstGeom prst="rect">
+            <a:avLst/>
+          </a:prstGeom>
+        </p:spPr>
+        <p:txBody>
+          <a:bodyPr vert="horz" lIns="91440" tIns="45720" rIns="91440" bIns="45720" rtlCol="0"/>
+          <a:lstStyle>
+            <a:lvl1pPr algn="l">
+              <a:defRPr sz="1200"/>
+            </a:lvl1pPr>
+          </a:lstStyle>
+          <a:p>
+            <a:endParaRPr lang="pt-PT"/>
+          </a:p>
+        </p:txBody>
+      </p:sp>
+      <p:sp>
+        <p:nvSpPr>
+          <p:cNvPr id="3" name="Marcador de Posição da Data 2"/>
+          <p:cNvSpPr>
+            <a:spLocks noGrp="1"/>
+          </p:cNvSpPr>
+          <p:nvPr>
+            <p:ph type="dt" idx="1"/>
+          </p:nvPr>
+        </p:nvSpPr>
+        <p:spPr>
+          <a:xfrm>
+            <a:off x="3884613" y="0"/>
+            <a:ext cx="2971800" cy="458788"/>
+          </a:xfrm>
+          <a:prstGeom prst="rect">
+            <a:avLst/>
+          </a:prstGeom>
+        </p:spPr>
+        <p:txBody>
+          <a:bodyPr vert="horz" lIns="91440" tIns="45720" rIns="91440" bIns="45720" rtlCol="0"/>
+          <a:lstStyle>
+            <a:lvl1pPr algn="r">
+              <a:defRPr sz="1200"/>
+            </a:lvl1pPr>
+          </a:lstStyle>
+          <a:p>
+            <a:fld id="{A5C096E7-A69E-D048-9D58-78B6BC38440F}" type="datetimeFigureOut">
+              <a:rPr lang="pt-PT" smtClean="0"/>
+              <a:t>25/06/24</a:t>
+            </a:fld>
+            <a:endParaRPr lang="pt-PT"/>
+          </a:p>
+        </p:txBody>
+      </p:sp>
+      <p:sp>
+        <p:nvSpPr>
+          <p:cNvPr id="4" name="Marcador de Posição da Imagem do Diapositivo 3"/>
+          <p:cNvSpPr>
+            <a:spLocks noGrp="1" noRot="1" noChangeAspect="1"/>
+          </p:cNvSpPr>
+          <p:nvPr>
+            <p:ph type="sldImg" idx="2"/>
+          </p:nvPr>
+        </p:nvSpPr>
+        <p:spPr>
+          <a:xfrm>
+            <a:off x="685800" y="1143000"/>
+            <a:ext cx="5486400" cy="3086100"/>
+          </a:xfrm>
+          <a:prstGeom prst="rect">
+            <a:avLst/>
+          </a:prstGeom>
+          <a:noFill/>
+          <a:ln w="12700">
+            <a:solidFill>
+              <a:prstClr val="black"/>
+            </a:solidFill>
+          </a:ln>
+        </p:spPr>
+        <p:txBody>
+          <a:bodyPr vert="horz" lIns="91440" tIns="45720" rIns="91440" bIns="45720" rtlCol="0" anchor="ctr"/>
+          <a:lstStyle/>
+          <a:p>
+            <a:endParaRPr lang="pt-PT"/>
+          </a:p>
+        </p:txBody>
+      </p:sp>
+      <p:sp>
+        <p:nvSpPr>
+          <p:cNvPr id="5" name="Marcador de Posição de Notas 4"/>
+          <p:cNvSpPr>
+            <a:spLocks noGrp="1"/>
+          </p:cNvSpPr>
+          <p:nvPr>
+            <p:ph type="body" sz="quarter" idx="3"/>
+          </p:nvPr>
+        </p:nvSpPr>
+        <p:spPr>
+          <a:xfrm>
+            <a:off x="685800" y="4400550"/>
+            <a:ext cx="5486400" cy="3600450"/>
+          </a:xfrm>
+          <a:prstGeom prst="rect">
+            <a:avLst/>
+          </a:prstGeom>
+        </p:spPr>
+        <p:txBody>
+          <a:bodyPr vert="horz" lIns="91440" tIns="45720" rIns="91440" bIns="45720" rtlCol="0"/>
+          <a:lstStyle/>
+          <a:p>
+            <a:pPr lvl="0"/>
+            <a:r>
+              <a:rPr lang="pt-PT"/>
+              <a:t>Clique para editar os estilos do texto de Modelo Global</a:t>
+            </a:r>
+          </a:p>
+          <a:p>
+            <a:pPr lvl="1"/>
+            <a:r>
+              <a:rPr lang="pt-PT"/>
+              <a:t>Segundo nível</a:t>
+            </a:r>
+          </a:p>
+          <a:p>
+            <a:pPr lvl="2"/>
+            <a:r>
+              <a:rPr lang="pt-PT"/>
+              <a:t>Terceiro nível</a:t>
+            </a:r>
+          </a:p>
+          <a:p>
+            <a:pPr lvl="3"/>
+            <a:r>
+              <a:rPr lang="pt-PT"/>
+              <a:t>Quarto nível</a:t>
+            </a:r>
+          </a:p>
+          <a:p>
+            <a:pPr lvl="4"/>
+            <a:r>
+              <a:rPr lang="pt-PT"/>
+              <a:t>Quinto nível</a:t>
+            </a:r>
+          </a:p>
+        </p:txBody>
+      </p:sp>
+      <p:sp>
+        <p:nvSpPr>
+          <p:cNvPr id="6" name="Marcador de Posição do Rodapé 5"/>
+          <p:cNvSpPr>
+            <a:spLocks noGrp="1"/>
+          </p:cNvSpPr>
+          <p:nvPr>
+            <p:ph type="ftr" sz="quarter" idx="4"/>
+          </p:nvPr>
+        </p:nvSpPr>
+        <p:spPr>
+          <a:xfrm>
+            <a:off x="0" y="8685213"/>
+            <a:ext cx="2971800" cy="458787"/>
+          </a:xfrm>
+          <a:prstGeom prst="rect">
+            <a:avLst/>
+          </a:prstGeom>
+        </p:spPr>
+        <p:txBody>
+          <a:bodyPr vert="horz" lIns="91440" tIns="45720" rIns="91440" bIns="45720" rtlCol="0" anchor="b"/>
+          <a:lstStyle>
+            <a:lvl1pPr algn="l">
+              <a:defRPr sz="1200"/>
+            </a:lvl1pPr>
+          </a:lstStyle>
+          <a:p>
+            <a:endParaRPr lang="pt-PT"/>
+          </a:p>
+        </p:txBody>
+      </p:sp>
+      <p:sp>
+        <p:nvSpPr>
+          <p:cNvPr id="7" name="Marcador de Posição do Número do Diapositivo 6"/>
+          <p:cNvSpPr>
+            <a:spLocks noGrp="1"/>
+          </p:cNvSpPr>
+          <p:nvPr>
+            <p:ph type="sldNum" sz="quarter" idx="5"/>
+          </p:nvPr>
+        </p:nvSpPr>
+        <p:spPr>
+          <a:xfrm>
+            <a:off x="3884613" y="8685213"/>
+            <a:ext cx="2971800" cy="458787"/>
+          </a:xfrm>
+          <a:prstGeom prst="rect">
+            <a:avLst/>
+          </a:prstGeom>
+        </p:spPr>
+        <p:txBody>
+          <a:bodyPr vert="horz" lIns="91440" tIns="45720" rIns="91440" bIns="45720" rtlCol="0" anchor="b"/>
+          <a:lstStyle>
+            <a:lvl1pPr algn="r">
+              <a:defRPr sz="1200"/>
+            </a:lvl1pPr>
+          </a:lstStyle>
+          <a:p>
+            <a:fld id="{06FF6586-5F78-6E43-B410-242E09B3C667}" type="slidenum">
+              <a:rPr lang="pt-PT" smtClean="0"/>
+              <a:t>‹nº›</a:t>
+            </a:fld>
+            <a:endParaRPr lang="pt-PT"/>
+          </a:p>
+        </p:txBody>
+      </p:sp>
+    </p:spTree>
+    <p:extLst>
+      <p:ext uri="{BB962C8B-B14F-4D97-AF65-F5344CB8AC3E}">
+        <p14:creationId xmlns:p14="http://schemas.microsoft.com/office/powerpoint/2010/main" val="114459463"/>
+      </p:ext>
+    </p:extLst>
+  </p:cSld>
+  <p:clrMap bg1="lt1" tx1="dk1" bg2="lt2" tx2="dk2" accent1="accent1" accent2="accent2" accent3="accent3" accent4="accent4" accent5="accent5" accent6="accent6" hlink="hlink" folHlink="folHlink"/>
+  <p:notesStyle>
+    <a:lvl1pPr marL="0" algn="l" defTabSz="914400" rtl="0" eaLnBrk="1" latinLnBrk="0" hangingPunct="1">
+      <a:defRPr sz="1200" kern="1200">
+        <a:solidFill>
+          <a:schemeClr val="tx1"/>
+        </a:solidFill>
+        <a:latin typeface="+mn-lt"/>
+        <a:ea typeface="+mn-ea"/>
+        <a:cs typeface="+mn-cs"/>
+      </a:defRPr>
+    </a:lvl1pPr>
+    <a:lvl2pPr marL="457200" algn="l" defTabSz="914400" rtl="0" eaLnBrk="1" latinLnBrk="0" hangingPunct="1">
+      <a:defRPr sz="1200" kern="1200">
+        <a:solidFill>
+          <a:schemeClr val="tx1"/>
+        </a:solidFill>
+        <a:latin typeface="+mn-lt"/>
+        <a:ea typeface="+mn-ea"/>
+        <a:cs typeface="+mn-cs"/>
+      </a:defRPr>
+    </a:lvl2pPr>
+    <a:lvl3pPr marL="914400" algn="l" defTabSz="914400" rtl="0" eaLnBrk="1" latinLnBrk="0" hangingPunct="1">
+      <a:defRPr sz="1200" kern="1200">
+        <a:solidFill>
+          <a:schemeClr val="tx1"/>
+        </a:solidFill>
+        <a:latin typeface="+mn-lt"/>
+        <a:ea typeface="+mn-ea"/>
+        <a:cs typeface="+mn-cs"/>
+      </a:defRPr>
+    </a:lvl3pPr>
+    <a:lvl4pPr marL="1371600" algn="l" defTabSz="914400" rtl="0" eaLnBrk="1" latinLnBrk="0" hangingPunct="1">
+      <a:defRPr sz="1200" kern="1200">
+        <a:solidFill>
+          <a:schemeClr val="tx1"/>
+        </a:solidFill>
+        <a:latin typeface="+mn-lt"/>
+        <a:ea typeface="+mn-ea"/>
+        <a:cs typeface="+mn-cs"/>
+      </a:defRPr>
+    </a:lvl4pPr>
+    <a:lvl5pPr marL="1828800" algn="l" defTabSz="914400" rtl="0" eaLnBrk="1" latinLnBrk="0" hangingPunct="1">
+      <a:defRPr sz="1200" kern="1200">
+        <a:solidFill>
+          <a:schemeClr val="tx1"/>
+        </a:solidFill>
+        <a:latin typeface="+mn-lt"/>
+        <a:ea typeface="+mn-ea"/>
+        <a:cs typeface="+mn-cs"/>
+      </a:defRPr>
+    </a:lvl5pPr>
+    <a:lvl6pPr marL="2286000" algn="l" defTabSz="914400" rtl="0" eaLnBrk="1" latinLnBrk="0" hangingPunct="1">
+      <a:defRPr sz="1200" kern="1200">
+        <a:solidFill>
+          <a:schemeClr val="tx1"/>
+        </a:solidFill>
+        <a:latin typeface="+mn-lt"/>
+        <a:ea typeface="+mn-ea"/>
+        <a:cs typeface="+mn-cs"/>
+      </a:defRPr>
+    </a:lvl6pPr>
+    <a:lvl7pPr marL="2743200" algn="l" defTabSz="914400" rtl="0" eaLnBrk="1" latinLnBrk="0" hangingPunct="1">
+      <a:defRPr sz="1200" kern="1200">
+        <a:solidFill>
+          <a:schemeClr val="tx1"/>
+        </a:solidFill>
+        <a:latin typeface="+mn-lt"/>
+        <a:ea typeface="+mn-ea"/>
+        <a:cs typeface="+mn-cs"/>
+      </a:defRPr>
+    </a:lvl7pPr>
+    <a:lvl8pPr marL="3200400" algn="l" defTabSz="914400" rtl="0" eaLnBrk="1" latinLnBrk="0" hangingPunct="1">
+      <a:defRPr sz="1200" kern="1200">
+        <a:solidFill>
+          <a:schemeClr val="tx1"/>
+        </a:solidFill>
+        <a:latin typeface="+mn-lt"/>
+        <a:ea typeface="+mn-ea"/>
+        <a:cs typeface="+mn-cs"/>
+      </a:defRPr>
+    </a:lvl8pPr>
+    <a:lvl9pPr marL="3657600" algn="l" defTabSz="914400" rtl="0" eaLnBrk="1" latinLnBrk="0" hangingPunct="1">
+      <a:defRPr sz="1200" kern="1200">
+        <a:solidFill>
+          <a:schemeClr val="tx1"/>
+        </a:solidFill>
+        <a:latin typeface="+mn-lt"/>
+        <a:ea typeface="+mn-ea"/>
+        <a:cs typeface="+mn-cs"/>
+      </a:defRPr>
+    </a:lvl9pPr>
+  </p:notesStyle>
+</p:notesMaster>
+</file>
+
+<file path=ppt/notesSlides/notesSlide1.xml><?xml version="1.0" encoding="utf-8"?>
+<p:notes xmlns:a="http://schemas.openxmlformats.org/drawingml/2006/main" xmlns:r="http://schemas.openxmlformats.org/officeDocument/2006/relationships" xmlns:p="http://schemas.openxmlformats.org/presentationml/2006/main">
+  <p:cSld>
+    <p:spTree>
+      <p:nvGrpSpPr>
+        <p:cNvPr id="1" name=""/>
+        <p:cNvGrpSpPr/>
+        <p:nvPr/>
+      </p:nvGrpSpPr>
+      <p:grpSpPr>
+        <a:xfrm>
+          <a:off x="0" y="0"/>
+          <a:ext cx="0" cy="0"/>
+          <a:chOff x="0" y="0"/>
+          <a:chExt cx="0" cy="0"/>
+        </a:xfrm>
+      </p:grpSpPr>
+      <p:sp>
+        <p:nvSpPr>
+          <p:cNvPr id="2" name="Marcador de Posição da Imagem do Diapositivo 1"/>
+          <p:cNvSpPr>
+            <a:spLocks noGrp="1" noRot="1" noChangeAspect="1"/>
+          </p:cNvSpPr>
+          <p:nvPr>
+            <p:ph type="sldImg"/>
+          </p:nvPr>
+        </p:nvSpPr>
+        <p:spPr/>
+      </p:sp>
+      <p:sp>
+        <p:nvSpPr>
+          <p:cNvPr id="3" name="Marcador de Posição de Notas 2"/>
+          <p:cNvSpPr>
+            <a:spLocks noGrp="1"/>
+          </p:cNvSpPr>
+          <p:nvPr>
+            <p:ph type="body" idx="1"/>
+          </p:nvPr>
+        </p:nvSpPr>
+        <p:spPr/>
+        <p:txBody>
+          <a:bodyPr/>
+          <a:lstStyle/>
+          <a:p>
+            <a:pPr algn="just">
+              <a:lnSpc>
+                <a:spcPct val="115000"/>
+              </a:lnSpc>
+              <a:spcAft>
+                <a:spcPts val="800"/>
+              </a:spcAft>
+            </a:pPr>
+            <a:r>
+              <a:rPr lang="pt-PT" sz="1800" kern="100" dirty="0">
+                <a:effectLst/>
+                <a:latin typeface="Aptos" panose="020B0004020202020204" pitchFamily="34" charset="0"/>
+                <a:ea typeface="Aptos" panose="020B0004020202020204" pitchFamily="34" charset="0"/>
+                <a:cs typeface="Times New Roman" panose="02020603050405020304" pitchFamily="18" charset="0"/>
+              </a:rPr>
+              <a:t>Antes de começar a análise e o tratamento dos dados, começamos por ver a estrutura do </a:t>
+            </a:r>
+            <a:r>
+              <a:rPr lang="pt-PT" sz="1800" i="1" kern="100" dirty="0" err="1">
+                <a:effectLst/>
+                <a:latin typeface="Aptos" panose="020B0004020202020204" pitchFamily="34" charset="0"/>
+                <a:ea typeface="Aptos" panose="020B0004020202020204" pitchFamily="34" charset="0"/>
+                <a:cs typeface="Times New Roman" panose="02020603050405020304" pitchFamily="18" charset="0"/>
+              </a:rPr>
+              <a:t>dataset</a:t>
+            </a:r>
+            <a:r>
+              <a:rPr lang="pt-PT" sz="1800" kern="100" dirty="0">
+                <a:effectLst/>
+                <a:latin typeface="Aptos" panose="020B0004020202020204" pitchFamily="34" charset="0"/>
+                <a:ea typeface="Aptos" panose="020B0004020202020204" pitchFamily="34" charset="0"/>
+                <a:cs typeface="Times New Roman" panose="02020603050405020304" pitchFamily="18" charset="0"/>
+              </a:rPr>
+              <a:t> a ser utilizado para compreender quais são as características químicas avaliadas - </a:t>
+            </a:r>
+            <a:r>
+              <a:rPr lang="pt-PT" sz="1800" kern="100" dirty="0" err="1">
+                <a:effectLst/>
+                <a:latin typeface="Aptos" panose="020B0004020202020204" pitchFamily="34" charset="0"/>
+                <a:ea typeface="Aptos" panose="020B0004020202020204" pitchFamily="34" charset="0"/>
+                <a:cs typeface="Times New Roman" panose="02020603050405020304" pitchFamily="18" charset="0"/>
+              </a:rPr>
+              <a:t>df.head</a:t>
+            </a:r>
+            <a:r>
+              <a:rPr lang="pt-PT" sz="1800" kern="100" dirty="0">
+                <a:effectLst/>
+                <a:latin typeface="Aptos" panose="020B0004020202020204" pitchFamily="34" charset="0"/>
+                <a:ea typeface="Aptos" panose="020B0004020202020204" pitchFamily="34" charset="0"/>
+                <a:cs typeface="Times New Roman" panose="02020603050405020304" pitchFamily="18" charset="0"/>
+              </a:rPr>
+              <a:t>(). </a:t>
+            </a:r>
+          </a:p>
+          <a:p>
+            <a:pPr algn="just">
+              <a:lnSpc>
+                <a:spcPct val="115000"/>
+              </a:lnSpc>
+              <a:spcAft>
+                <a:spcPts val="800"/>
+              </a:spcAft>
+            </a:pPr>
+            <a:r>
+              <a:rPr lang="pt-PT" sz="1800" kern="100" dirty="0">
+                <a:effectLst/>
+                <a:latin typeface="Aptos" panose="020B0004020202020204" pitchFamily="34" charset="0"/>
+                <a:ea typeface="Aptos" panose="020B0004020202020204" pitchFamily="34" charset="0"/>
+                <a:cs typeface="Times New Roman" panose="02020603050405020304" pitchFamily="18" charset="0"/>
+              </a:rPr>
+              <a:t>Deste modo, podemos concluir que para além do tipo de vinho – branco ou tinto – existem 12 características com registos: acidez fixa, acidez volátil, ácido cítrico, açúcar residual, cloretos, dióxido de enxofre, densidade, pH, sulfatos, álcool e qualidade.</a:t>
+            </a:r>
+          </a:p>
+          <a:p>
+            <a:pPr algn="just">
+              <a:lnSpc>
+                <a:spcPct val="115000"/>
+              </a:lnSpc>
+              <a:spcAft>
+                <a:spcPts val="800"/>
+              </a:spcAft>
+            </a:pPr>
+            <a:r>
+              <a:rPr lang="pt-PT" sz="1800" kern="100" dirty="0">
+                <a:effectLst/>
+                <a:latin typeface="Aptos" panose="020B0004020202020204" pitchFamily="34" charset="0"/>
+                <a:ea typeface="Aptos" panose="020B0004020202020204" pitchFamily="34" charset="0"/>
+                <a:cs typeface="Times New Roman" panose="02020603050405020304" pitchFamily="18" charset="0"/>
+              </a:rPr>
+              <a:t> </a:t>
+            </a:r>
+          </a:p>
+        </p:txBody>
+      </p:sp>
+      <p:sp>
+        <p:nvSpPr>
+          <p:cNvPr id="4" name="Marcador de Posição do Número do Diapositivo 3"/>
+          <p:cNvSpPr>
+            <a:spLocks noGrp="1"/>
+          </p:cNvSpPr>
+          <p:nvPr>
+            <p:ph type="sldNum" sz="quarter" idx="5"/>
+          </p:nvPr>
+        </p:nvSpPr>
+        <p:spPr/>
+        <p:txBody>
+          <a:bodyPr/>
+          <a:lstStyle/>
+          <a:p>
+            <a:fld id="{06FF6586-5F78-6E43-B410-242E09B3C667}" type="slidenum">
+              <a:rPr lang="pt-PT" smtClean="0"/>
+              <a:t>3</a:t>
+            </a:fld>
+            <a:endParaRPr lang="pt-PT"/>
+          </a:p>
+        </p:txBody>
+      </p:sp>
+    </p:spTree>
+    <p:extLst>
+      <p:ext uri="{BB962C8B-B14F-4D97-AF65-F5344CB8AC3E}">
+        <p14:creationId xmlns:p14="http://schemas.microsoft.com/office/powerpoint/2010/main" val="1603384303"/>
+      </p:ext>
+    </p:extLst>
+  </p:cSld>
+  <p:clrMapOvr>
+    <a:masterClrMapping/>
+  </p:clrMapOvr>
+</p:notes>
+</file>
+
+<file path=ppt/notesSlides/notesSlide10.xml><?xml version="1.0" encoding="utf-8"?>
+<p:notes xmlns:a="http://schemas.openxmlformats.org/drawingml/2006/main" xmlns:r="http://schemas.openxmlformats.org/officeDocument/2006/relationships" xmlns:p="http://schemas.openxmlformats.org/presentationml/2006/main">
+  <p:cSld>
+    <p:spTree>
+      <p:nvGrpSpPr>
+        <p:cNvPr id="1" name=""/>
+        <p:cNvGrpSpPr/>
+        <p:nvPr/>
+      </p:nvGrpSpPr>
+      <p:grpSpPr>
+        <a:xfrm>
+          <a:off x="0" y="0"/>
+          <a:ext cx="0" cy="0"/>
+          <a:chOff x="0" y="0"/>
+          <a:chExt cx="0" cy="0"/>
+        </a:xfrm>
+      </p:grpSpPr>
+      <p:sp>
+        <p:nvSpPr>
+          <p:cNvPr id="2" name="Marcador de Posição da Imagem do Diapositivo 1"/>
+          <p:cNvSpPr>
+            <a:spLocks noGrp="1" noRot="1" noChangeAspect="1"/>
+          </p:cNvSpPr>
+          <p:nvPr>
+            <p:ph type="sldImg"/>
+          </p:nvPr>
+        </p:nvSpPr>
+        <p:spPr/>
+      </p:sp>
+      <p:sp>
+        <p:nvSpPr>
+          <p:cNvPr id="3" name="Marcador de Posição de Notas 2"/>
+          <p:cNvSpPr>
+            <a:spLocks noGrp="1"/>
+          </p:cNvSpPr>
+          <p:nvPr>
+            <p:ph type="body" idx="1"/>
+          </p:nvPr>
+        </p:nvSpPr>
+        <p:spPr/>
+        <p:txBody>
+          <a:bodyPr/>
+          <a:lstStyle/>
+          <a:p>
+            <a:r>
+              <a:rPr lang="pt-PT" dirty="0"/>
+              <a:t>Foram criados 5 modelos de classificação: </a:t>
+            </a:r>
+            <a:r>
+              <a:rPr lang="pt-PT" dirty="0" err="1"/>
+              <a:t>Decision</a:t>
+            </a:r>
+            <a:r>
+              <a:rPr lang="pt-PT" dirty="0"/>
+              <a:t> </a:t>
+            </a:r>
+            <a:r>
+              <a:rPr lang="pt-PT" dirty="0" err="1"/>
+              <a:t>Tree</a:t>
+            </a:r>
+            <a:r>
+              <a:rPr lang="pt-PT" dirty="0"/>
+              <a:t> </a:t>
+            </a:r>
+            <a:r>
+              <a:rPr lang="pt-PT" dirty="0" err="1"/>
+              <a:t>Classifier</a:t>
+            </a:r>
+            <a:r>
+              <a:rPr lang="pt-PT" dirty="0"/>
+              <a:t> (não otimizado e otimizada), </a:t>
+            </a:r>
+            <a:r>
+              <a:rPr lang="pt-PT" dirty="0" err="1"/>
+              <a:t>Random</a:t>
+            </a:r>
+            <a:r>
+              <a:rPr lang="pt-PT" dirty="0"/>
+              <a:t> </a:t>
+            </a:r>
+            <a:r>
+              <a:rPr lang="pt-PT" dirty="0" err="1"/>
+              <a:t>Forest</a:t>
+            </a:r>
+            <a:r>
+              <a:rPr lang="pt-PT" dirty="0"/>
+              <a:t> </a:t>
+            </a:r>
+            <a:r>
+              <a:rPr lang="pt-PT" dirty="0" err="1"/>
+              <a:t>Classsifier</a:t>
+            </a:r>
+            <a:r>
+              <a:rPr lang="pt-PT" dirty="0"/>
+              <a:t> (não otimizado e otimizada) e </a:t>
+            </a:r>
+            <a:r>
+              <a:rPr lang="pt-PT" dirty="0" err="1"/>
+              <a:t>Scalable</a:t>
+            </a:r>
+            <a:r>
+              <a:rPr lang="pt-PT" dirty="0"/>
+              <a:t> </a:t>
+            </a:r>
+            <a:r>
+              <a:rPr lang="pt-PT" dirty="0" err="1"/>
+              <a:t>Vector</a:t>
+            </a:r>
+            <a:r>
+              <a:rPr lang="pt-PT" dirty="0"/>
+              <a:t> </a:t>
+            </a:r>
+            <a:r>
+              <a:rPr lang="pt-PT" dirty="0" err="1"/>
+              <a:t>Classifier</a:t>
+            </a:r>
+            <a:r>
+              <a:rPr lang="pt-PT" dirty="0"/>
+              <a:t> (SVC). Através desta tabela, pode-se retirar várias conclusões. A primeira é sobre a ineficácia das otimizações dos modelos </a:t>
+            </a:r>
+            <a:r>
+              <a:rPr lang="pt-PT" dirty="0" err="1"/>
+              <a:t>Decision</a:t>
+            </a:r>
+            <a:r>
+              <a:rPr lang="pt-PT" dirty="0"/>
+              <a:t> </a:t>
+            </a:r>
+            <a:r>
+              <a:rPr lang="pt-PT" dirty="0" err="1"/>
+              <a:t>Tree</a:t>
+            </a:r>
+            <a:r>
+              <a:rPr lang="pt-PT" dirty="0"/>
+              <a:t> e </a:t>
+            </a:r>
+            <a:r>
+              <a:rPr lang="pt-PT" dirty="0" err="1"/>
+              <a:t>Random</a:t>
+            </a:r>
+            <a:r>
+              <a:rPr lang="pt-PT" dirty="0"/>
+              <a:t> </a:t>
+            </a:r>
+            <a:r>
+              <a:rPr lang="pt-PT" dirty="0" err="1"/>
+              <a:t>Forest</a:t>
+            </a:r>
+            <a:r>
+              <a:rPr lang="pt-PT" dirty="0"/>
+              <a:t> em que os resultados obtidos foram iguais aos resultados obtidos nos modelos não otimizados. A segunda é a não necessidade de otimizar o modelo SVC uma vez que os valores obtidos inicialmente são mais baixos que os valores obtidos nos restantes modelos. Por fim, ao comparar os valores dos modelos com melhores resultados, percebe-se que os melhores modelos para prever corretamente o tipo de vinho são os modelos </a:t>
+            </a:r>
+            <a:r>
+              <a:rPr lang="pt-PT" dirty="0" err="1"/>
+              <a:t>Random</a:t>
+            </a:r>
+            <a:r>
+              <a:rPr lang="pt-PT" dirty="0"/>
+              <a:t> </a:t>
+            </a:r>
+            <a:r>
+              <a:rPr lang="pt-PT" dirty="0" err="1"/>
+              <a:t>Forest</a:t>
+            </a:r>
+            <a:r>
+              <a:rPr lang="pt-PT" dirty="0"/>
+              <a:t>, em que todos os parâmetros foram de 0.99</a:t>
+            </a:r>
+          </a:p>
+        </p:txBody>
+      </p:sp>
+      <p:sp>
+        <p:nvSpPr>
+          <p:cNvPr id="4" name="Marcador de Posição do Número do Diapositivo 3"/>
+          <p:cNvSpPr>
+            <a:spLocks noGrp="1"/>
+          </p:cNvSpPr>
+          <p:nvPr>
+            <p:ph type="sldNum" sz="quarter" idx="5"/>
+          </p:nvPr>
+        </p:nvSpPr>
+        <p:spPr/>
+        <p:txBody>
+          <a:bodyPr/>
+          <a:lstStyle/>
+          <a:p>
+            <a:fld id="{06FF6586-5F78-6E43-B410-242E09B3C667}" type="slidenum">
+              <a:rPr lang="pt-PT" smtClean="0"/>
+              <a:t>12</a:t>
+            </a:fld>
+            <a:endParaRPr lang="pt-PT"/>
+          </a:p>
+        </p:txBody>
+      </p:sp>
+    </p:spTree>
+    <p:extLst>
+      <p:ext uri="{BB962C8B-B14F-4D97-AF65-F5344CB8AC3E}">
+        <p14:creationId xmlns:p14="http://schemas.microsoft.com/office/powerpoint/2010/main" val="3375622627"/>
+      </p:ext>
+    </p:extLst>
+  </p:cSld>
+  <p:clrMapOvr>
+    <a:masterClrMapping/>
+  </p:clrMapOvr>
+</p:notes>
+</file>
+
+<file path=ppt/notesSlides/notesSlide11.xml><?xml version="1.0" encoding="utf-8"?>
+<p:notes xmlns:a="http://schemas.openxmlformats.org/drawingml/2006/main" xmlns:r="http://schemas.openxmlformats.org/officeDocument/2006/relationships" xmlns:p="http://schemas.openxmlformats.org/presentationml/2006/main">
+  <p:cSld>
+    <p:spTree>
+      <p:nvGrpSpPr>
+        <p:cNvPr id="1" name=""/>
+        <p:cNvGrpSpPr/>
+        <p:nvPr/>
+      </p:nvGrpSpPr>
+      <p:grpSpPr>
+        <a:xfrm>
+          <a:off x="0" y="0"/>
+          <a:ext cx="0" cy="0"/>
+          <a:chOff x="0" y="0"/>
+          <a:chExt cx="0" cy="0"/>
+        </a:xfrm>
+      </p:grpSpPr>
+      <p:sp>
+        <p:nvSpPr>
+          <p:cNvPr id="2" name="Marcador de Posição da Imagem do Diapositivo 1"/>
+          <p:cNvSpPr>
+            <a:spLocks noGrp="1" noRot="1" noChangeAspect="1"/>
+          </p:cNvSpPr>
+          <p:nvPr>
+            <p:ph type="sldImg"/>
+          </p:nvPr>
+        </p:nvSpPr>
+        <p:spPr/>
+      </p:sp>
+      <p:sp>
+        <p:nvSpPr>
+          <p:cNvPr id="3" name="Marcador de Posição de Notas 2"/>
+          <p:cNvSpPr>
+            <a:spLocks noGrp="1"/>
+          </p:cNvSpPr>
+          <p:nvPr>
+            <p:ph type="body" idx="1"/>
+          </p:nvPr>
+        </p:nvSpPr>
+        <p:spPr/>
+        <p:txBody>
+          <a:bodyPr/>
+          <a:lstStyle/>
+          <a:p>
+            <a:r>
+              <a:rPr lang="pt-PT" dirty="0"/>
+              <a:t>Em relação aos modelos de regressão, o objetivo principal é prever a qualidade do vinho. Com base na análise feita, ficou compreendido que embora a correlação entre as diferentes características seja distinta com a qualidade seja distinta, todas têm impacto na qualidade percebida. Deste modo, os valores atribuídos a X compreendem todos os valores exceto os de qualidade que serão atribuídos à variável y. Após a atribuição dos valores às variáveis a serem utilizadas, ocorreu a divisão dos valores de treino e de teste.</a:t>
+            </a:r>
+          </a:p>
+        </p:txBody>
+      </p:sp>
+      <p:sp>
+        <p:nvSpPr>
+          <p:cNvPr id="4" name="Marcador de Posição do Número do Diapositivo 3"/>
+          <p:cNvSpPr>
+            <a:spLocks noGrp="1"/>
+          </p:cNvSpPr>
+          <p:nvPr>
+            <p:ph type="sldNum" sz="quarter" idx="5"/>
+          </p:nvPr>
+        </p:nvSpPr>
+        <p:spPr/>
+        <p:txBody>
+          <a:bodyPr/>
+          <a:lstStyle/>
+          <a:p>
+            <a:fld id="{06FF6586-5F78-6E43-B410-242E09B3C667}" type="slidenum">
+              <a:rPr lang="pt-PT" smtClean="0"/>
+              <a:t>13</a:t>
+            </a:fld>
+            <a:endParaRPr lang="pt-PT"/>
+          </a:p>
+        </p:txBody>
+      </p:sp>
+    </p:spTree>
+    <p:extLst>
+      <p:ext uri="{BB962C8B-B14F-4D97-AF65-F5344CB8AC3E}">
+        <p14:creationId xmlns:p14="http://schemas.microsoft.com/office/powerpoint/2010/main" val="4064545539"/>
+      </p:ext>
+    </p:extLst>
+  </p:cSld>
+  <p:clrMapOvr>
+    <a:masterClrMapping/>
+  </p:clrMapOvr>
+</p:notes>
+</file>
+
+<file path=ppt/notesSlides/notesSlide12.xml><?xml version="1.0" encoding="utf-8"?>
+<p:notes xmlns:a="http://schemas.openxmlformats.org/drawingml/2006/main" xmlns:r="http://schemas.openxmlformats.org/officeDocument/2006/relationships" xmlns:p="http://schemas.openxmlformats.org/presentationml/2006/main">
+  <p:cSld>
+    <p:spTree>
+      <p:nvGrpSpPr>
+        <p:cNvPr id="1" name=""/>
+        <p:cNvGrpSpPr/>
+        <p:nvPr/>
+      </p:nvGrpSpPr>
+      <p:grpSpPr>
+        <a:xfrm>
+          <a:off x="0" y="0"/>
+          <a:ext cx="0" cy="0"/>
+          <a:chOff x="0" y="0"/>
+          <a:chExt cx="0" cy="0"/>
+        </a:xfrm>
+      </p:grpSpPr>
+      <p:sp>
+        <p:nvSpPr>
+          <p:cNvPr id="2" name="Marcador de Posição da Imagem do Diapositivo 1"/>
+          <p:cNvSpPr>
+            <a:spLocks noGrp="1" noRot="1" noChangeAspect="1"/>
+          </p:cNvSpPr>
+          <p:nvPr>
+            <p:ph type="sldImg"/>
+          </p:nvPr>
+        </p:nvSpPr>
+        <p:spPr/>
+      </p:sp>
+      <p:sp>
+        <p:nvSpPr>
+          <p:cNvPr id="3" name="Marcador de Posição de Notas 2"/>
+          <p:cNvSpPr>
+            <a:spLocks noGrp="1"/>
+          </p:cNvSpPr>
+          <p:nvPr>
+            <p:ph type="body" idx="1"/>
+          </p:nvPr>
+        </p:nvSpPr>
+        <p:spPr/>
+        <p:txBody>
+          <a:bodyPr/>
+          <a:lstStyle/>
+          <a:p>
+            <a:r>
+              <a:rPr lang="pt-PT" dirty="0"/>
+              <a:t>Analisando os resultados, desta vez uma das otimizações, a do modelo </a:t>
+            </a:r>
+            <a:r>
+              <a:rPr lang="pt-PT" dirty="0" err="1"/>
+              <a:t>Random</a:t>
+            </a:r>
+            <a:r>
+              <a:rPr lang="pt-PT" dirty="0"/>
+              <a:t> </a:t>
+            </a:r>
+            <a:r>
+              <a:rPr lang="pt-PT" dirty="0" err="1"/>
+              <a:t>Forest</a:t>
+            </a:r>
+            <a:r>
+              <a:rPr lang="pt-PT" dirty="0"/>
+              <a:t>, foi eficaz, tendo o modelo otimizado não só obtido melhores valores que o modelo não otimizado como foi o modelo que se apresentou como ideal para prever a qualidade dos vinhos. No entanto, a otimização do modelo </a:t>
+            </a:r>
+            <a:r>
+              <a:rPr lang="pt-PT" dirty="0" err="1"/>
+              <a:t>XGBoost</a:t>
+            </a:r>
+            <a:r>
+              <a:rPr lang="pt-PT" dirty="0"/>
+              <a:t> não teve qualquer importância por terem sido obtidos os mesmos valores. Apesar disto, o modelo que apresentou uma pior capacidade de previsão foi o modelo de Linear </a:t>
+            </a:r>
+            <a:r>
+              <a:rPr lang="pt-PT" dirty="0" err="1"/>
+              <a:t>Regression</a:t>
+            </a:r>
+            <a:r>
+              <a:rPr lang="pt-PT" dirty="0"/>
+              <a:t>, tendo obtido um coeficiente de erro mais de 2 décimas inferior ao melhor modelo. </a:t>
+            </a:r>
+          </a:p>
+        </p:txBody>
+      </p:sp>
+      <p:sp>
+        <p:nvSpPr>
+          <p:cNvPr id="4" name="Marcador de Posição do Número do Diapositivo 3"/>
+          <p:cNvSpPr>
+            <a:spLocks noGrp="1"/>
+          </p:cNvSpPr>
+          <p:nvPr>
+            <p:ph type="sldNum" sz="quarter" idx="5"/>
+          </p:nvPr>
+        </p:nvSpPr>
+        <p:spPr/>
+        <p:txBody>
+          <a:bodyPr/>
+          <a:lstStyle/>
+          <a:p>
+            <a:fld id="{06FF6586-5F78-6E43-B410-242E09B3C667}" type="slidenum">
+              <a:rPr lang="pt-PT" smtClean="0"/>
+              <a:t>14</a:t>
+            </a:fld>
+            <a:endParaRPr lang="pt-PT"/>
+          </a:p>
+        </p:txBody>
+      </p:sp>
+    </p:spTree>
+    <p:extLst>
+      <p:ext uri="{BB962C8B-B14F-4D97-AF65-F5344CB8AC3E}">
+        <p14:creationId xmlns:p14="http://schemas.microsoft.com/office/powerpoint/2010/main" val="4000709191"/>
+      </p:ext>
+    </p:extLst>
+  </p:cSld>
+  <p:clrMapOvr>
+    <a:masterClrMapping/>
+  </p:clrMapOvr>
+</p:notes>
+</file>
+
+<file path=ppt/notesSlides/notesSlide2.xml><?xml version="1.0" encoding="utf-8"?>
+<p:notes xmlns:a="http://schemas.openxmlformats.org/drawingml/2006/main" xmlns:r="http://schemas.openxmlformats.org/officeDocument/2006/relationships" xmlns:p="http://schemas.openxmlformats.org/presentationml/2006/main">
+  <p:cSld>
+    <p:spTree>
+      <p:nvGrpSpPr>
+        <p:cNvPr id="1" name=""/>
+        <p:cNvGrpSpPr/>
+        <p:nvPr/>
+      </p:nvGrpSpPr>
+      <p:grpSpPr>
+        <a:xfrm>
+          <a:off x="0" y="0"/>
+          <a:ext cx="0" cy="0"/>
+          <a:chOff x="0" y="0"/>
+          <a:chExt cx="0" cy="0"/>
+        </a:xfrm>
+      </p:grpSpPr>
+      <p:sp>
+        <p:nvSpPr>
+          <p:cNvPr id="2" name="Marcador de Posição da Imagem do Diapositivo 1"/>
+          <p:cNvSpPr>
+            <a:spLocks noGrp="1" noRot="1" noChangeAspect="1"/>
+          </p:cNvSpPr>
+          <p:nvPr>
+            <p:ph type="sldImg"/>
+          </p:nvPr>
+        </p:nvSpPr>
+        <p:spPr/>
+      </p:sp>
+      <p:sp>
+        <p:nvSpPr>
+          <p:cNvPr id="3" name="Marcador de Posição de Notas 2"/>
+          <p:cNvSpPr>
+            <a:spLocks noGrp="1"/>
+          </p:cNvSpPr>
+          <p:nvPr>
+            <p:ph type="body" idx="1"/>
+          </p:nvPr>
+        </p:nvSpPr>
+        <p:spPr/>
+        <p:txBody>
+          <a:bodyPr/>
+          <a:lstStyle/>
+          <a:p>
+            <a:pPr algn="just">
+              <a:lnSpc>
+                <a:spcPct val="115000"/>
+              </a:lnSpc>
+              <a:spcAft>
+                <a:spcPts val="800"/>
+              </a:spcAft>
+            </a:pPr>
+            <a:r>
+              <a:rPr lang="pt-PT" sz="1800" kern="100" dirty="0">
+                <a:effectLst/>
+                <a:latin typeface="Aptos" panose="020B0004020202020204" pitchFamily="34" charset="0"/>
+                <a:ea typeface="Aptos" panose="020B0004020202020204" pitchFamily="34" charset="0"/>
+                <a:cs typeface="Times New Roman" panose="02020603050405020304" pitchFamily="18" charset="0"/>
+              </a:rPr>
+              <a:t>Conhecidas as características a serem utilizadas para a avaliação dos vinhos, é necessário saber o comportamento dos valores do </a:t>
+            </a:r>
+            <a:r>
+              <a:rPr lang="pt-PT" sz="1800" kern="100" dirty="0" err="1">
+                <a:effectLst/>
+                <a:latin typeface="Aptos" panose="020B0004020202020204" pitchFamily="34" charset="0"/>
+                <a:ea typeface="Aptos" panose="020B0004020202020204" pitchFamily="34" charset="0"/>
+                <a:cs typeface="Times New Roman" panose="02020603050405020304" pitchFamily="18" charset="0"/>
+              </a:rPr>
+              <a:t>dataset</a:t>
+            </a:r>
+            <a:r>
+              <a:rPr lang="pt-PT" sz="1800" kern="100" dirty="0">
+                <a:effectLst/>
+                <a:latin typeface="Aptos" panose="020B0004020202020204" pitchFamily="34" charset="0"/>
+                <a:ea typeface="Aptos" panose="020B0004020202020204" pitchFamily="34" charset="0"/>
+                <a:cs typeface="Times New Roman" panose="02020603050405020304" pitchFamily="18" charset="0"/>
+              </a:rPr>
+              <a:t>. Começamos esta exploração dos dados pela procura de valores nulos, tendo sido encontrados valores nulos nos atributos: acidez fixa, acidez volátil, ácido cítrico, açúcar residual, cloretos, pH e sulfatos. </a:t>
+            </a:r>
+          </a:p>
+          <a:p>
+            <a:pPr algn="just">
+              <a:lnSpc>
+                <a:spcPct val="115000"/>
+              </a:lnSpc>
+              <a:spcAft>
+                <a:spcPts val="800"/>
+              </a:spcAft>
+            </a:pPr>
+            <a:r>
+              <a:rPr lang="pt-PT" sz="1800" kern="100" dirty="0">
+                <a:effectLst/>
+                <a:latin typeface="Aptos" panose="020B0004020202020204" pitchFamily="34" charset="0"/>
+                <a:ea typeface="Aptos" panose="020B0004020202020204" pitchFamily="34" charset="0"/>
+                <a:cs typeface="Times New Roman" panose="02020603050405020304" pitchFamily="18" charset="0"/>
+              </a:rPr>
+              <a:t>Uma vez que a quantidade de valores nulos é mínima em comparação aos números de linhas do </a:t>
+            </a:r>
+            <a:r>
+              <a:rPr lang="pt-PT" sz="1800" kern="100" dirty="0" err="1">
+                <a:effectLst/>
+                <a:latin typeface="Aptos" panose="020B0004020202020204" pitchFamily="34" charset="0"/>
+                <a:ea typeface="Aptos" panose="020B0004020202020204" pitchFamily="34" charset="0"/>
+                <a:cs typeface="Times New Roman" panose="02020603050405020304" pitchFamily="18" charset="0"/>
+              </a:rPr>
+              <a:t>dataset</a:t>
+            </a:r>
+            <a:r>
+              <a:rPr lang="pt-PT" sz="1800" kern="100" dirty="0">
+                <a:effectLst/>
+                <a:latin typeface="Aptos" panose="020B0004020202020204" pitchFamily="34" charset="0"/>
+                <a:ea typeface="Aptos" panose="020B0004020202020204" pitchFamily="34" charset="0"/>
+                <a:cs typeface="Times New Roman" panose="02020603050405020304" pitchFamily="18" charset="0"/>
+              </a:rPr>
+              <a:t>, por exemplo, o atributo com mais valores nulos é o da acidez fixa e tem somente 10 num </a:t>
+            </a:r>
+            <a:r>
+              <a:rPr lang="pt-PT" sz="1800" kern="100" dirty="0" err="1">
+                <a:effectLst/>
+                <a:latin typeface="Aptos" panose="020B0004020202020204" pitchFamily="34" charset="0"/>
+                <a:ea typeface="Aptos" panose="020B0004020202020204" pitchFamily="34" charset="0"/>
+                <a:cs typeface="Times New Roman" panose="02020603050405020304" pitchFamily="18" charset="0"/>
+              </a:rPr>
+              <a:t>dataset</a:t>
+            </a:r>
+            <a:r>
+              <a:rPr lang="pt-PT" sz="1800" kern="100" dirty="0">
+                <a:effectLst/>
+                <a:latin typeface="Aptos" panose="020B0004020202020204" pitchFamily="34" charset="0"/>
+                <a:ea typeface="Aptos" panose="020B0004020202020204" pitchFamily="34" charset="0"/>
+                <a:cs typeface="Times New Roman" panose="02020603050405020304" pitchFamily="18" charset="0"/>
+              </a:rPr>
+              <a:t> de 6497, optamos por eliminar estas linhas para não perturbar a análise dos dados.</a:t>
+            </a:r>
+          </a:p>
+          <a:p>
+            <a:pPr algn="just">
+              <a:lnSpc>
+                <a:spcPct val="115000"/>
+              </a:lnSpc>
+              <a:spcAft>
+                <a:spcPts val="800"/>
+              </a:spcAft>
+            </a:pPr>
+            <a:r>
+              <a:rPr lang="pt-PT" sz="1800" kern="100" dirty="0">
+                <a:effectLst/>
+                <a:latin typeface="Aptos" panose="020B0004020202020204" pitchFamily="34" charset="0"/>
+                <a:ea typeface="Aptos" panose="020B0004020202020204" pitchFamily="34" charset="0"/>
+                <a:cs typeface="Times New Roman" panose="02020603050405020304" pitchFamily="18" charset="0"/>
+              </a:rPr>
+              <a:t>Para além disso, olhando para os tipos de dados, chegamos rapidamente à conclusão de que é preciso converter o tipo de vinho de objeto para numérico para agilizar a análise. Para esta conversão, utilizamos a técnica de </a:t>
+            </a:r>
+            <a:r>
+              <a:rPr lang="pt-PT" sz="1800" kern="100" dirty="0" err="1">
+                <a:effectLst/>
+                <a:latin typeface="Aptos" panose="020B0004020202020204" pitchFamily="34" charset="0"/>
+                <a:ea typeface="Aptos" panose="020B0004020202020204" pitchFamily="34" charset="0"/>
+                <a:cs typeface="Times New Roman" panose="02020603050405020304" pitchFamily="18" charset="0"/>
+              </a:rPr>
+              <a:t>LabelEncoder</a:t>
+            </a:r>
+            <a:r>
+              <a:rPr lang="pt-PT" sz="1800" kern="100" dirty="0">
+                <a:effectLst/>
+                <a:latin typeface="Aptos" panose="020B0004020202020204" pitchFamily="34" charset="0"/>
+                <a:ea typeface="Aptos" panose="020B0004020202020204" pitchFamily="34" charset="0"/>
+                <a:cs typeface="Times New Roman" panose="02020603050405020304" pitchFamily="18" charset="0"/>
+              </a:rPr>
+              <a:t> para converter os vinhos brancos para 0 e os vinhos tintos para 1. </a:t>
+            </a:r>
+          </a:p>
+          <a:p>
+            <a:endParaRPr lang="pt-PT" dirty="0"/>
+          </a:p>
+        </p:txBody>
+      </p:sp>
+      <p:sp>
+        <p:nvSpPr>
+          <p:cNvPr id="4" name="Marcador de Posição do Número do Diapositivo 3"/>
+          <p:cNvSpPr>
+            <a:spLocks noGrp="1"/>
+          </p:cNvSpPr>
+          <p:nvPr>
+            <p:ph type="sldNum" sz="quarter" idx="5"/>
+          </p:nvPr>
+        </p:nvSpPr>
+        <p:spPr/>
+        <p:txBody>
+          <a:bodyPr/>
+          <a:lstStyle/>
+          <a:p>
+            <a:fld id="{06FF6586-5F78-6E43-B410-242E09B3C667}" type="slidenum">
+              <a:rPr lang="pt-PT" smtClean="0"/>
+              <a:t>4</a:t>
+            </a:fld>
+            <a:endParaRPr lang="pt-PT"/>
+          </a:p>
+        </p:txBody>
+      </p:sp>
+    </p:spTree>
+    <p:extLst>
+      <p:ext uri="{BB962C8B-B14F-4D97-AF65-F5344CB8AC3E}">
+        <p14:creationId xmlns:p14="http://schemas.microsoft.com/office/powerpoint/2010/main" val="209033418"/>
+      </p:ext>
+    </p:extLst>
+  </p:cSld>
+  <p:clrMapOvr>
+    <a:masterClrMapping/>
+  </p:clrMapOvr>
+</p:notes>
+</file>
+
+<file path=ppt/notesSlides/notesSlide3.xml><?xml version="1.0" encoding="utf-8"?>
+<p:notes xmlns:a="http://schemas.openxmlformats.org/drawingml/2006/main" xmlns:r="http://schemas.openxmlformats.org/officeDocument/2006/relationships" xmlns:p="http://schemas.openxmlformats.org/presentationml/2006/main">
+  <p:cSld>
+    <p:spTree>
+      <p:nvGrpSpPr>
+        <p:cNvPr id="1" name=""/>
+        <p:cNvGrpSpPr/>
+        <p:nvPr/>
+      </p:nvGrpSpPr>
+      <p:grpSpPr>
+        <a:xfrm>
+          <a:off x="0" y="0"/>
+          <a:ext cx="0" cy="0"/>
+          <a:chOff x="0" y="0"/>
+          <a:chExt cx="0" cy="0"/>
+        </a:xfrm>
+      </p:grpSpPr>
+      <p:sp>
+        <p:nvSpPr>
+          <p:cNvPr id="2" name="Marcador de Posição da Imagem do Diapositivo 1"/>
+          <p:cNvSpPr>
+            <a:spLocks noGrp="1" noRot="1" noChangeAspect="1"/>
+          </p:cNvSpPr>
+          <p:nvPr>
+            <p:ph type="sldImg"/>
+          </p:nvPr>
+        </p:nvSpPr>
+        <p:spPr/>
+      </p:sp>
+      <p:sp>
+        <p:nvSpPr>
+          <p:cNvPr id="3" name="Marcador de Posição de Notas 2"/>
+          <p:cNvSpPr>
+            <a:spLocks noGrp="1"/>
+          </p:cNvSpPr>
+          <p:nvPr>
+            <p:ph type="body" idx="1"/>
+          </p:nvPr>
+        </p:nvSpPr>
+        <p:spPr/>
+        <p:txBody>
+          <a:bodyPr/>
+          <a:lstStyle/>
+          <a:p>
+            <a:r>
+              <a:rPr lang="pt-PT" dirty="0"/>
+              <a:t>Após o primeiro tratamento dos dados, analisamos a variação dos valores das diferentes características. Primeiro, utilizamos o método .</a:t>
+            </a:r>
+            <a:r>
+              <a:rPr lang="pt-PT" dirty="0" err="1"/>
+              <a:t>describe</a:t>
+            </a:r>
+            <a:r>
+              <a:rPr lang="pt-PT" dirty="0"/>
+              <a:t>() para descobrir valores como o número de linhas, a média, o valor padrão, os valores mínimos e máximos e os percentis. De seguida, para poder compreender melhor os dados de cada atributo, optamos por criar histogramas de cada um dos atributos. Através desta representação visual, chegamos rapidamente à conclusão de que existiam </a:t>
+            </a:r>
+            <a:r>
+              <a:rPr lang="pt-PT" dirty="0" err="1"/>
+              <a:t>outliers</a:t>
+            </a:r>
+            <a:r>
+              <a:rPr lang="pt-PT" dirty="0"/>
+              <a:t> que poderiam prejudicar quer a análise, que a criação dos modelos de classificação e de regressão.  Deste modo, procedemos a remover estas valores.</a:t>
+            </a:r>
+          </a:p>
+        </p:txBody>
+      </p:sp>
+      <p:sp>
+        <p:nvSpPr>
+          <p:cNvPr id="4" name="Marcador de Posição do Número do Diapositivo 3"/>
+          <p:cNvSpPr>
+            <a:spLocks noGrp="1"/>
+          </p:cNvSpPr>
+          <p:nvPr>
+            <p:ph type="sldNum" sz="quarter" idx="5"/>
+          </p:nvPr>
+        </p:nvSpPr>
+        <p:spPr/>
+        <p:txBody>
+          <a:bodyPr/>
+          <a:lstStyle/>
+          <a:p>
+            <a:fld id="{06FF6586-5F78-6E43-B410-242E09B3C667}" type="slidenum">
+              <a:rPr lang="pt-PT" smtClean="0"/>
+              <a:t>5</a:t>
+            </a:fld>
+            <a:endParaRPr lang="pt-PT"/>
+          </a:p>
+        </p:txBody>
+      </p:sp>
+    </p:spTree>
+    <p:extLst>
+      <p:ext uri="{BB962C8B-B14F-4D97-AF65-F5344CB8AC3E}">
+        <p14:creationId xmlns:p14="http://schemas.microsoft.com/office/powerpoint/2010/main" val="3777587870"/>
+      </p:ext>
+    </p:extLst>
+  </p:cSld>
+  <p:clrMapOvr>
+    <a:masterClrMapping/>
+  </p:clrMapOvr>
+</p:notes>
+</file>
+
+<file path=ppt/notesSlides/notesSlide4.xml><?xml version="1.0" encoding="utf-8"?>
+<p:notes xmlns:a="http://schemas.openxmlformats.org/drawingml/2006/main" xmlns:r="http://schemas.openxmlformats.org/officeDocument/2006/relationships" xmlns:p="http://schemas.openxmlformats.org/presentationml/2006/main">
+  <p:cSld>
+    <p:spTree>
+      <p:nvGrpSpPr>
+        <p:cNvPr id="1" name=""/>
+        <p:cNvGrpSpPr/>
+        <p:nvPr/>
+      </p:nvGrpSpPr>
+      <p:grpSpPr>
+        <a:xfrm>
+          <a:off x="0" y="0"/>
+          <a:ext cx="0" cy="0"/>
+          <a:chOff x="0" y="0"/>
+          <a:chExt cx="0" cy="0"/>
+        </a:xfrm>
+      </p:grpSpPr>
+      <p:sp>
+        <p:nvSpPr>
+          <p:cNvPr id="2" name="Marcador de Posição da Imagem do Diapositivo 1"/>
+          <p:cNvSpPr>
+            <a:spLocks noGrp="1" noRot="1" noChangeAspect="1"/>
+          </p:cNvSpPr>
+          <p:nvPr>
+            <p:ph type="sldImg"/>
+          </p:nvPr>
+        </p:nvSpPr>
+        <p:spPr/>
+      </p:sp>
+      <p:sp>
+        <p:nvSpPr>
+          <p:cNvPr id="3" name="Marcador de Posição de Notas 2"/>
+          <p:cNvSpPr>
+            <a:spLocks noGrp="1"/>
+          </p:cNvSpPr>
+          <p:nvPr>
+            <p:ph type="body" idx="1"/>
+          </p:nvPr>
+        </p:nvSpPr>
+        <p:spPr/>
+        <p:txBody>
+          <a:bodyPr/>
+          <a:lstStyle/>
+          <a:p>
+            <a:r>
+              <a:rPr lang="pt-PT" dirty="0"/>
+              <a:t>Após a remoção dos valores, foram eliminadas cerca de 500 linhas do </a:t>
+            </a:r>
+            <a:r>
+              <a:rPr lang="pt-PT" dirty="0" err="1"/>
+              <a:t>dataset</a:t>
+            </a:r>
+            <a:r>
+              <a:rPr lang="pt-PT" dirty="0"/>
+              <a:t>, o que foi suficiente para notar diferenças significativas nos novos histogramas criados. Embora o número de dados eliminados seja considerável e seja esperado algum impacto na análise dos dados, o </a:t>
+            </a:r>
+            <a:r>
+              <a:rPr lang="pt-PT" dirty="0" err="1"/>
+              <a:t>dataset</a:t>
+            </a:r>
+            <a:r>
+              <a:rPr lang="pt-PT" dirty="0"/>
+              <a:t> continua a ter um valor bastante elevado de dados +- 6000 linhas, o que pode ser suficiente para </a:t>
+            </a:r>
+            <a:r>
+              <a:rPr lang="pt-PT" dirty="0" err="1"/>
+              <a:t>fa</a:t>
+            </a:r>
+            <a:endParaRPr lang="pt-PT" dirty="0"/>
+          </a:p>
+        </p:txBody>
+      </p:sp>
+      <p:sp>
+        <p:nvSpPr>
+          <p:cNvPr id="4" name="Marcador de Posição do Número do Diapositivo 3"/>
+          <p:cNvSpPr>
+            <a:spLocks noGrp="1"/>
+          </p:cNvSpPr>
+          <p:nvPr>
+            <p:ph type="sldNum" sz="quarter" idx="5"/>
+          </p:nvPr>
+        </p:nvSpPr>
+        <p:spPr/>
+        <p:txBody>
+          <a:bodyPr/>
+          <a:lstStyle/>
+          <a:p>
+            <a:fld id="{06FF6586-5F78-6E43-B410-242E09B3C667}" type="slidenum">
+              <a:rPr lang="pt-PT" smtClean="0"/>
+              <a:t>6</a:t>
+            </a:fld>
+            <a:endParaRPr lang="pt-PT"/>
+          </a:p>
+        </p:txBody>
+      </p:sp>
+    </p:spTree>
+    <p:extLst>
+      <p:ext uri="{BB962C8B-B14F-4D97-AF65-F5344CB8AC3E}">
+        <p14:creationId xmlns:p14="http://schemas.microsoft.com/office/powerpoint/2010/main" val="604867143"/>
+      </p:ext>
+    </p:extLst>
+  </p:cSld>
+  <p:clrMapOvr>
+    <a:masterClrMapping/>
+  </p:clrMapOvr>
+</p:notes>
+</file>
+
+<file path=ppt/notesSlides/notesSlide5.xml><?xml version="1.0" encoding="utf-8"?>
+<p:notes xmlns:a="http://schemas.openxmlformats.org/drawingml/2006/main" xmlns:r="http://schemas.openxmlformats.org/officeDocument/2006/relationships" xmlns:p="http://schemas.openxmlformats.org/presentationml/2006/main">
+  <p:cSld>
+    <p:spTree>
+      <p:nvGrpSpPr>
+        <p:cNvPr id="1" name=""/>
+        <p:cNvGrpSpPr/>
+        <p:nvPr/>
+      </p:nvGrpSpPr>
+      <p:grpSpPr>
+        <a:xfrm>
+          <a:off x="0" y="0"/>
+          <a:ext cx="0" cy="0"/>
+          <a:chOff x="0" y="0"/>
+          <a:chExt cx="0" cy="0"/>
+        </a:xfrm>
+      </p:grpSpPr>
+      <p:sp>
+        <p:nvSpPr>
+          <p:cNvPr id="2" name="Marcador de Posição da Imagem do Diapositivo 1"/>
+          <p:cNvSpPr>
+            <a:spLocks noGrp="1" noRot="1" noChangeAspect="1"/>
+          </p:cNvSpPr>
+          <p:nvPr>
+            <p:ph type="sldImg"/>
+          </p:nvPr>
+        </p:nvSpPr>
+        <p:spPr/>
+      </p:sp>
+      <p:sp>
+        <p:nvSpPr>
+          <p:cNvPr id="3" name="Marcador de Posição de Notas 2"/>
+          <p:cNvSpPr>
+            <a:spLocks noGrp="1"/>
+          </p:cNvSpPr>
+          <p:nvPr>
+            <p:ph type="body" idx="1"/>
+          </p:nvPr>
+        </p:nvSpPr>
+        <p:spPr/>
+        <p:txBody>
+          <a:bodyPr/>
+          <a:lstStyle/>
+          <a:p>
+            <a:r>
+              <a:rPr lang="pt-PT" dirty="0"/>
+              <a:t>Feito o tratamento de dados, procuramos descobrir as correlações das características dos vinhos. No entanto, chegamos à conclusão de que a estratégia mais apropriada seria analisar os dados de cada tipo de vinho individualmente através da técnica .</a:t>
+            </a:r>
+            <a:r>
+              <a:rPr lang="pt-PT" dirty="0" err="1"/>
+              <a:t>describe</a:t>
+            </a:r>
+            <a:r>
+              <a:rPr lang="pt-PT" dirty="0"/>
+              <a:t> junto da restrição do tipo de vinho. Através disto, a principal conclusão a que chegamos é que o </a:t>
+            </a:r>
+            <a:r>
+              <a:rPr lang="pt-PT" dirty="0" err="1"/>
+              <a:t>dataset</a:t>
+            </a:r>
+            <a:r>
+              <a:rPr lang="pt-PT" dirty="0"/>
+              <a:t> a ser analisado é um </a:t>
+            </a:r>
+            <a:r>
+              <a:rPr lang="pt-PT" dirty="0" err="1"/>
+              <a:t>dataset</a:t>
+            </a:r>
+            <a:r>
+              <a:rPr lang="pt-PT" dirty="0"/>
+              <a:t> </a:t>
+            </a:r>
+            <a:r>
+              <a:rPr lang="pt-PT" dirty="0" err="1"/>
+              <a:t>desbalanceado</a:t>
+            </a:r>
+            <a:r>
+              <a:rPr lang="pt-PT" dirty="0"/>
+              <a:t>, existindo 1583 linhas com dados relativos aos vinhos branco enquanto que existem 4845 linhas relativas aos vinhos tintos. Para além disso, em ambos os tipos de vinho, foi evidenciada uma variação elevada nos valores mínimos e máximos de ácido de enxofre total que precisa de ser analisada mais detalhadamente.</a:t>
+            </a:r>
+          </a:p>
+        </p:txBody>
+      </p:sp>
+      <p:sp>
+        <p:nvSpPr>
+          <p:cNvPr id="4" name="Marcador de Posição do Número do Diapositivo 3"/>
+          <p:cNvSpPr>
+            <a:spLocks noGrp="1"/>
+          </p:cNvSpPr>
+          <p:nvPr>
+            <p:ph type="sldNum" sz="quarter" idx="5"/>
+          </p:nvPr>
+        </p:nvSpPr>
+        <p:spPr/>
+        <p:txBody>
+          <a:bodyPr/>
+          <a:lstStyle/>
+          <a:p>
+            <a:fld id="{06FF6586-5F78-6E43-B410-242E09B3C667}" type="slidenum">
+              <a:rPr lang="pt-PT" smtClean="0"/>
+              <a:t>7</a:t>
+            </a:fld>
+            <a:endParaRPr lang="pt-PT"/>
+          </a:p>
+        </p:txBody>
+      </p:sp>
+    </p:spTree>
+    <p:extLst>
+      <p:ext uri="{BB962C8B-B14F-4D97-AF65-F5344CB8AC3E}">
+        <p14:creationId xmlns:p14="http://schemas.microsoft.com/office/powerpoint/2010/main" val="3904174609"/>
+      </p:ext>
+    </p:extLst>
+  </p:cSld>
+  <p:clrMapOvr>
+    <a:masterClrMapping/>
+  </p:clrMapOvr>
+</p:notes>
+</file>
+
+<file path=ppt/notesSlides/notesSlide6.xml><?xml version="1.0" encoding="utf-8"?>
+<p:notes xmlns:a="http://schemas.openxmlformats.org/drawingml/2006/main" xmlns:r="http://schemas.openxmlformats.org/officeDocument/2006/relationships" xmlns:p="http://schemas.openxmlformats.org/presentationml/2006/main">
+  <p:cSld>
+    <p:spTree>
+      <p:nvGrpSpPr>
+        <p:cNvPr id="1" name=""/>
+        <p:cNvGrpSpPr/>
+        <p:nvPr/>
+      </p:nvGrpSpPr>
+      <p:grpSpPr>
+        <a:xfrm>
+          <a:off x="0" y="0"/>
+          <a:ext cx="0" cy="0"/>
+          <a:chOff x="0" y="0"/>
+          <a:chExt cx="0" cy="0"/>
+        </a:xfrm>
+      </p:grpSpPr>
+      <p:sp>
+        <p:nvSpPr>
+          <p:cNvPr id="2" name="Marcador de Posição da Imagem do Diapositivo 1"/>
+          <p:cNvSpPr>
+            <a:spLocks noGrp="1" noRot="1" noChangeAspect="1"/>
+          </p:cNvSpPr>
+          <p:nvPr>
+            <p:ph type="sldImg"/>
+          </p:nvPr>
+        </p:nvSpPr>
+        <p:spPr/>
+      </p:sp>
+      <p:sp>
+        <p:nvSpPr>
+          <p:cNvPr id="3" name="Marcador de Posição de Notas 2"/>
+          <p:cNvSpPr>
+            <a:spLocks noGrp="1"/>
+          </p:cNvSpPr>
+          <p:nvPr>
+            <p:ph type="body" idx="1"/>
+          </p:nvPr>
+        </p:nvSpPr>
+        <p:spPr/>
+        <p:txBody>
+          <a:bodyPr/>
+          <a:lstStyle/>
+          <a:p>
+            <a:r>
+              <a:rPr lang="pt-PT" dirty="0"/>
+              <a:t>Para analisar a variação da quantidade total de dióxido de enxofre, optamos por criar um histograma tendo tido em atenção o facto que o </a:t>
+            </a:r>
+            <a:r>
+              <a:rPr lang="pt-PT" dirty="0" err="1"/>
+              <a:t>dataset</a:t>
+            </a:r>
+            <a:r>
+              <a:rPr lang="pt-PT" dirty="0"/>
+              <a:t> é </a:t>
+            </a:r>
+            <a:r>
+              <a:rPr lang="pt-PT" dirty="0" err="1"/>
+              <a:t>desbalanceado</a:t>
+            </a:r>
+            <a:r>
+              <a:rPr lang="pt-PT" dirty="0"/>
+              <a:t>. Assim, para a criação do gráfico convertemos as quantidades de dados referentes a cada tipo de vinhos em percentagens para tornar o gráfico mais adequado. A conclusão a que se chegou foi que apesar de existir um intervalo de valores comuns entre os dois tipos de vinhos - a roxo no gráfico -, os vinhos tintos apresentam uma quantidade total superior aos vinhos brancos, o que pode ser relevante para a diferenciação dos tipos de vinho.</a:t>
+            </a:r>
+          </a:p>
+        </p:txBody>
+      </p:sp>
+      <p:sp>
+        <p:nvSpPr>
+          <p:cNvPr id="4" name="Marcador de Posição do Número do Diapositivo 3"/>
+          <p:cNvSpPr>
+            <a:spLocks noGrp="1"/>
+          </p:cNvSpPr>
+          <p:nvPr>
+            <p:ph type="sldNum" sz="quarter" idx="5"/>
+          </p:nvPr>
+        </p:nvSpPr>
+        <p:spPr/>
+        <p:txBody>
+          <a:bodyPr/>
+          <a:lstStyle/>
+          <a:p>
+            <a:fld id="{06FF6586-5F78-6E43-B410-242E09B3C667}" type="slidenum">
+              <a:rPr lang="pt-PT" smtClean="0"/>
+              <a:t>8</a:t>
+            </a:fld>
+            <a:endParaRPr lang="pt-PT"/>
+          </a:p>
+        </p:txBody>
+      </p:sp>
+    </p:spTree>
+    <p:extLst>
+      <p:ext uri="{BB962C8B-B14F-4D97-AF65-F5344CB8AC3E}">
+        <p14:creationId xmlns:p14="http://schemas.microsoft.com/office/powerpoint/2010/main" val="367461676"/>
+      </p:ext>
+    </p:extLst>
+  </p:cSld>
+  <p:clrMapOvr>
+    <a:masterClrMapping/>
+  </p:clrMapOvr>
+</p:notes>
+</file>
+
+<file path=ppt/notesSlides/notesSlide7.xml><?xml version="1.0" encoding="utf-8"?>
+<p:notes xmlns:a="http://schemas.openxmlformats.org/drawingml/2006/main" xmlns:r="http://schemas.openxmlformats.org/officeDocument/2006/relationships" xmlns:p="http://schemas.openxmlformats.org/presentationml/2006/main">
+  <p:cSld>
+    <p:spTree>
+      <p:nvGrpSpPr>
+        <p:cNvPr id="1" name=""/>
+        <p:cNvGrpSpPr/>
+        <p:nvPr/>
+      </p:nvGrpSpPr>
+      <p:grpSpPr>
+        <a:xfrm>
+          <a:off x="0" y="0"/>
+          <a:ext cx="0" cy="0"/>
+          <a:chOff x="0" y="0"/>
+          <a:chExt cx="0" cy="0"/>
+        </a:xfrm>
+      </p:grpSpPr>
+      <p:sp>
+        <p:nvSpPr>
+          <p:cNvPr id="2" name="Marcador de Posição da Imagem do Diapositivo 1"/>
+          <p:cNvSpPr>
+            <a:spLocks noGrp="1" noRot="1" noChangeAspect="1"/>
+          </p:cNvSpPr>
+          <p:nvPr>
+            <p:ph type="sldImg"/>
+          </p:nvPr>
+        </p:nvSpPr>
+        <p:spPr/>
+      </p:sp>
+      <p:sp>
+        <p:nvSpPr>
+          <p:cNvPr id="3" name="Marcador de Posição de Notas 2"/>
+          <p:cNvSpPr>
+            <a:spLocks noGrp="1"/>
+          </p:cNvSpPr>
+          <p:nvPr>
+            <p:ph type="body" idx="1"/>
+          </p:nvPr>
+        </p:nvSpPr>
+        <p:spPr/>
+        <p:txBody>
+          <a:bodyPr/>
+          <a:lstStyle/>
+          <a:p>
+            <a:r>
+              <a:rPr lang="pt-PT" dirty="0"/>
+              <a:t>Para compreender o impacto dos diferentes atributos na qualidade percebida dos vinhos, criamos este gráfico (</a:t>
+            </a:r>
+            <a:r>
+              <a:rPr lang="pt-PT" dirty="0" err="1"/>
+              <a:t>barplot</a:t>
+            </a:r>
+            <a:r>
+              <a:rPr lang="pt-PT" dirty="0"/>
+              <a:t>) para descobrir as correlações. Assim, foi possível concluir que os atributos com maior correlação com a qualidade são o álcool e o tipo de vinho e os atributos com menor correlação são a densidade, a quantidade de cloretos e a acidez volátil.</a:t>
+            </a:r>
+          </a:p>
+        </p:txBody>
+      </p:sp>
+      <p:sp>
+        <p:nvSpPr>
+          <p:cNvPr id="4" name="Marcador de Posição do Número do Diapositivo 3"/>
+          <p:cNvSpPr>
+            <a:spLocks noGrp="1"/>
+          </p:cNvSpPr>
+          <p:nvPr>
+            <p:ph type="sldNum" sz="quarter" idx="5"/>
+          </p:nvPr>
+        </p:nvSpPr>
+        <p:spPr/>
+        <p:txBody>
+          <a:bodyPr/>
+          <a:lstStyle/>
+          <a:p>
+            <a:fld id="{06FF6586-5F78-6E43-B410-242E09B3C667}" type="slidenum">
+              <a:rPr lang="pt-PT" smtClean="0"/>
+              <a:t>9</a:t>
+            </a:fld>
+            <a:endParaRPr lang="pt-PT"/>
+          </a:p>
+        </p:txBody>
+      </p:sp>
+    </p:spTree>
+    <p:extLst>
+      <p:ext uri="{BB962C8B-B14F-4D97-AF65-F5344CB8AC3E}">
+        <p14:creationId xmlns:p14="http://schemas.microsoft.com/office/powerpoint/2010/main" val="1707444488"/>
+      </p:ext>
+    </p:extLst>
+  </p:cSld>
+  <p:clrMapOvr>
+    <a:masterClrMapping/>
+  </p:clrMapOvr>
+</p:notes>
+</file>
+
+<file path=ppt/notesSlides/notesSlide8.xml><?xml version="1.0" encoding="utf-8"?>
+<p:notes xmlns:a="http://schemas.openxmlformats.org/drawingml/2006/main" xmlns:r="http://schemas.openxmlformats.org/officeDocument/2006/relationships" xmlns:p="http://schemas.openxmlformats.org/presentationml/2006/main">
+  <p:cSld>
+    <p:spTree>
+      <p:nvGrpSpPr>
+        <p:cNvPr id="1" name=""/>
+        <p:cNvGrpSpPr/>
+        <p:nvPr/>
+      </p:nvGrpSpPr>
+      <p:grpSpPr>
+        <a:xfrm>
+          <a:off x="0" y="0"/>
+          <a:ext cx="0" cy="0"/>
+          <a:chOff x="0" y="0"/>
+          <a:chExt cx="0" cy="0"/>
+        </a:xfrm>
+      </p:grpSpPr>
+      <p:sp>
+        <p:nvSpPr>
+          <p:cNvPr id="2" name="Marcador de Posição da Imagem do Diapositivo 1"/>
+          <p:cNvSpPr>
+            <a:spLocks noGrp="1" noRot="1" noChangeAspect="1"/>
+          </p:cNvSpPr>
+          <p:nvPr>
+            <p:ph type="sldImg"/>
+          </p:nvPr>
+        </p:nvSpPr>
+        <p:spPr/>
+      </p:sp>
+      <p:sp>
+        <p:nvSpPr>
+          <p:cNvPr id="3" name="Marcador de Posição de Notas 2"/>
+          <p:cNvSpPr>
+            <a:spLocks noGrp="1"/>
+          </p:cNvSpPr>
+          <p:nvPr>
+            <p:ph type="body" idx="1"/>
+          </p:nvPr>
+        </p:nvSpPr>
+        <p:spPr/>
+        <p:txBody>
+          <a:bodyPr/>
+          <a:lstStyle/>
+          <a:p>
+            <a:r>
+              <a:rPr lang="pt-PT" dirty="0"/>
+              <a:t>Antes de avançar para a criação dos modelos de classificação e de regressão, apresentamos um resumo das principais conclusões que foram retiradas da análise feita e que são essenciais para o processo de pré-processamento. </a:t>
+            </a:r>
+          </a:p>
+          <a:p>
+            <a:r>
+              <a:rPr lang="pt-PT" dirty="0"/>
+              <a:t>No caso da classificação, ao comparar os valores obtidos com .</a:t>
+            </a:r>
+            <a:r>
+              <a:rPr lang="pt-PT" dirty="0" err="1"/>
+              <a:t>describe</a:t>
+            </a:r>
+            <a:r>
+              <a:rPr lang="pt-PT" dirty="0"/>
+              <a:t> para cada tipo de vinho conclui-se que os valores que mais se destacam (são mais elevados) nos vinhos brancos são a acidez fixa, a acidez volátil, a quantidade de cloretos, a densidade, o pH e os sulfatos, enquanto que nos vinhos brancos os valores que mais se destacam são a acidez cítrica, a quantidade de açúcar e o dióxido de enxofre. Para além disso, também se notou que os valores de qualidade foram idênticos para ambos tipos de vinho, podendo essa característica ser descartada para a criação dos modelos de classificação.</a:t>
+            </a:r>
+          </a:p>
+          <a:p>
+            <a:r>
+              <a:rPr lang="pt-PT" dirty="0"/>
+              <a:t>No caso da regressão, conclui-se que todos os atributos são relevantes em termos de correlação, evidenciando-se o álcool, o tipo de vinho, a densidade, a quantidade de cloretos e a acidez volátil. Deste modo, não se pode descartar nenhuma característica.</a:t>
+            </a:r>
+          </a:p>
+        </p:txBody>
+      </p:sp>
+      <p:sp>
+        <p:nvSpPr>
+          <p:cNvPr id="4" name="Marcador de Posição do Número do Diapositivo 3"/>
+          <p:cNvSpPr>
+            <a:spLocks noGrp="1"/>
+          </p:cNvSpPr>
+          <p:nvPr>
+            <p:ph type="sldNum" sz="quarter" idx="5"/>
+          </p:nvPr>
+        </p:nvSpPr>
+        <p:spPr/>
+        <p:txBody>
+          <a:bodyPr/>
+          <a:lstStyle/>
+          <a:p>
+            <a:fld id="{06FF6586-5F78-6E43-B410-242E09B3C667}" type="slidenum">
+              <a:rPr lang="pt-PT" smtClean="0"/>
+              <a:t>10</a:t>
+            </a:fld>
+            <a:endParaRPr lang="pt-PT"/>
+          </a:p>
+        </p:txBody>
+      </p:sp>
+    </p:spTree>
+    <p:extLst>
+      <p:ext uri="{BB962C8B-B14F-4D97-AF65-F5344CB8AC3E}">
+        <p14:creationId xmlns:p14="http://schemas.microsoft.com/office/powerpoint/2010/main" val="2685838777"/>
+      </p:ext>
+    </p:extLst>
+  </p:cSld>
+  <p:clrMapOvr>
+    <a:masterClrMapping/>
+  </p:clrMapOvr>
+</p:notes>
+</file>
+
+<file path=ppt/notesSlides/notesSlide9.xml><?xml version="1.0" encoding="utf-8"?>
+<p:notes xmlns:a="http://schemas.openxmlformats.org/drawingml/2006/main" xmlns:r="http://schemas.openxmlformats.org/officeDocument/2006/relationships" xmlns:p="http://schemas.openxmlformats.org/presentationml/2006/main">
+  <p:cSld>
+    <p:spTree>
+      <p:nvGrpSpPr>
+        <p:cNvPr id="1" name=""/>
+        <p:cNvGrpSpPr/>
+        <p:nvPr/>
+      </p:nvGrpSpPr>
+      <p:grpSpPr>
+        <a:xfrm>
+          <a:off x="0" y="0"/>
+          <a:ext cx="0" cy="0"/>
+          <a:chOff x="0" y="0"/>
+          <a:chExt cx="0" cy="0"/>
+        </a:xfrm>
+      </p:grpSpPr>
+      <p:sp>
+        <p:nvSpPr>
+          <p:cNvPr id="2" name="Marcador de Posição da Imagem do Diapositivo 1"/>
+          <p:cNvSpPr>
+            <a:spLocks noGrp="1" noRot="1" noChangeAspect="1"/>
+          </p:cNvSpPr>
+          <p:nvPr>
+            <p:ph type="sldImg"/>
+          </p:nvPr>
+        </p:nvSpPr>
+        <p:spPr/>
+      </p:sp>
+      <p:sp>
+        <p:nvSpPr>
+          <p:cNvPr id="3" name="Marcador de Posição de Notas 2"/>
+          <p:cNvSpPr>
+            <a:spLocks noGrp="1"/>
+          </p:cNvSpPr>
+          <p:nvPr>
+            <p:ph type="body" idx="1"/>
+          </p:nvPr>
+        </p:nvSpPr>
+        <p:spPr/>
+        <p:txBody>
+          <a:bodyPr/>
+          <a:lstStyle/>
+          <a:p>
+            <a:r>
+              <a:rPr lang="pt-PT" dirty="0"/>
+              <a:t>O objetivo principal para os modelos de classificação é prever corretamente o tipo de vinho. Assim, com base na análise feita, os valores do X contém todas as características exceto o tipo de vinho, que é o nosso alvo de análise correspondendo ao Y, e a qualidade, dado que esta não varia consoante o tipo de vinho. Após esta divisão dos valores, seguiu-se a definição dos valores a serem treinados e os valores de teste.</a:t>
+            </a:r>
+          </a:p>
+        </p:txBody>
+      </p:sp>
+      <p:sp>
+        <p:nvSpPr>
+          <p:cNvPr id="4" name="Marcador de Posição do Número do Diapositivo 3"/>
+          <p:cNvSpPr>
+            <a:spLocks noGrp="1"/>
+          </p:cNvSpPr>
+          <p:nvPr>
+            <p:ph type="sldNum" sz="quarter" idx="5"/>
+          </p:nvPr>
+        </p:nvSpPr>
+        <p:spPr/>
+        <p:txBody>
+          <a:bodyPr/>
+          <a:lstStyle/>
+          <a:p>
+            <a:fld id="{06FF6586-5F78-6E43-B410-242E09B3C667}" type="slidenum">
+              <a:rPr lang="pt-PT" smtClean="0"/>
+              <a:t>11</a:t>
+            </a:fld>
+            <a:endParaRPr lang="pt-PT"/>
+          </a:p>
+        </p:txBody>
+      </p:sp>
+    </p:spTree>
+    <p:extLst>
+      <p:ext uri="{BB962C8B-B14F-4D97-AF65-F5344CB8AC3E}">
+        <p14:creationId xmlns:p14="http://schemas.microsoft.com/office/powerpoint/2010/main" val="2262758814"/>
+      </p:ext>
+    </p:extLst>
+  </p:cSld>
+  <p:clrMapOvr>
+    <a:masterClrMapping/>
+  </p:clrMapOvr>
+</p:notes>
+</file>
+
 <file path=ppt/slideLayouts/slideLayout1.xml><?xml version="1.0" encoding="utf-8"?>
 <p:sldLayout xmlns:a="http://schemas.openxmlformats.org/drawingml/2006/main" xmlns:r="http://schemas.openxmlformats.org/officeDocument/2006/relationships" xmlns:p="http://schemas.openxmlformats.org/presentationml/2006/main" type="title" preserve="1">
   <p:cSld name="Diapositivo de Título">
@@ -622,7 +2496,7 @@
           <a:p>
             <a:fld id="{D5183E39-E9F0-374E-B3E9-F2BF945C19D9}" type="datetimeFigureOut">
               <a:rPr lang="pt-PT" smtClean="0"/>
-              <a:t>21/06/24</a:t>
+              <a:t>25/06/24</a:t>
             </a:fld>
             <a:endParaRPr lang="pt-PT"/>
           </a:p>
@@ -820,7 +2694,7 @@
           <a:p>
             <a:fld id="{D5183E39-E9F0-374E-B3E9-F2BF945C19D9}" type="datetimeFigureOut">
               <a:rPr lang="pt-PT" smtClean="0"/>
-              <a:t>21/06/24</a:t>
+              <a:t>25/06/24</a:t>
             </a:fld>
             <a:endParaRPr lang="pt-PT"/>
           </a:p>
@@ -1028,7 +2902,7 @@
           <a:p>
             <a:fld id="{D5183E39-E9F0-374E-B3E9-F2BF945C19D9}" type="datetimeFigureOut">
               <a:rPr lang="pt-PT" smtClean="0"/>
-              <a:t>21/06/24</a:t>
+              <a:t>25/06/24</a:t>
             </a:fld>
             <a:endParaRPr lang="pt-PT"/>
           </a:p>
@@ -1226,7 +3100,7 @@
           <a:p>
             <a:fld id="{D5183E39-E9F0-374E-B3E9-F2BF945C19D9}" type="datetimeFigureOut">
               <a:rPr lang="pt-PT" smtClean="0"/>
-              <a:t>21/06/24</a:t>
+              <a:t>25/06/24</a:t>
             </a:fld>
             <a:endParaRPr lang="pt-PT"/>
           </a:p>
@@ -1501,7 +3375,7 @@
           <a:p>
             <a:fld id="{D5183E39-E9F0-374E-B3E9-F2BF945C19D9}" type="datetimeFigureOut">
               <a:rPr lang="pt-PT" smtClean="0"/>
-              <a:t>21/06/24</a:t>
+              <a:t>25/06/24</a:t>
             </a:fld>
             <a:endParaRPr lang="pt-PT"/>
           </a:p>
@@ -1766,7 +3640,7 @@
           <a:p>
             <a:fld id="{D5183E39-E9F0-374E-B3E9-F2BF945C19D9}" type="datetimeFigureOut">
               <a:rPr lang="pt-PT" smtClean="0"/>
-              <a:t>21/06/24</a:t>
+              <a:t>25/06/24</a:t>
             </a:fld>
             <a:endParaRPr lang="pt-PT"/>
           </a:p>
@@ -2178,7 +4052,7 @@
           <a:p>
             <a:fld id="{D5183E39-E9F0-374E-B3E9-F2BF945C19D9}" type="datetimeFigureOut">
               <a:rPr lang="pt-PT" smtClean="0"/>
-              <a:t>21/06/24</a:t>
+              <a:t>25/06/24</a:t>
             </a:fld>
             <a:endParaRPr lang="pt-PT"/>
           </a:p>
@@ -2319,7 +4193,7 @@
           <a:p>
             <a:fld id="{D5183E39-E9F0-374E-B3E9-F2BF945C19D9}" type="datetimeFigureOut">
               <a:rPr lang="pt-PT" smtClean="0"/>
-              <a:t>21/06/24</a:t>
+              <a:t>25/06/24</a:t>
             </a:fld>
             <a:endParaRPr lang="pt-PT"/>
           </a:p>
@@ -2432,7 +4306,7 @@
           <a:p>
             <a:fld id="{D5183E39-E9F0-374E-B3E9-F2BF945C19D9}" type="datetimeFigureOut">
               <a:rPr lang="pt-PT" smtClean="0"/>
-              <a:t>21/06/24</a:t>
+              <a:t>25/06/24</a:t>
             </a:fld>
             <a:endParaRPr lang="pt-PT"/>
           </a:p>
@@ -2743,7 +4617,7 @@
           <a:p>
             <a:fld id="{D5183E39-E9F0-374E-B3E9-F2BF945C19D9}" type="datetimeFigureOut">
               <a:rPr lang="pt-PT" smtClean="0"/>
-              <a:t>21/06/24</a:t>
+              <a:t>25/06/24</a:t>
             </a:fld>
             <a:endParaRPr lang="pt-PT"/>
           </a:p>
@@ -3031,7 +4905,7 @@
           <a:p>
             <a:fld id="{D5183E39-E9F0-374E-B3E9-F2BF945C19D9}" type="datetimeFigureOut">
               <a:rPr lang="pt-PT" smtClean="0"/>
-              <a:t>21/06/24</a:t>
+              <a:t>25/06/24</a:t>
             </a:fld>
             <a:endParaRPr lang="pt-PT"/>
           </a:p>
@@ -3272,7 +5146,7 @@
           <a:p>
             <a:fld id="{D5183E39-E9F0-374E-B3E9-F2BF945C19D9}" type="datetimeFigureOut">
               <a:rPr lang="pt-PT" smtClean="0"/>
-              <a:t>21/06/24</a:t>
+              <a:t>25/06/24</a:t>
             </a:fld>
             <a:endParaRPr lang="pt-PT"/>
           </a:p>
@@ -4503,7 +6377,7 @@
             </a:pPr>
             <a:r>
               <a:rPr lang="pt-PT" dirty="0"/>
-              <a:t>Acidez cítrica, açúcar, dióxido sulfúrico.</a:t>
+              <a:t>Acidez cítrica, açúcar, dióxido de enxofre.</a:t>
             </a:r>
           </a:p>
         </p:txBody>
@@ -4699,7 +6573,7 @@
           <p:nvPr/>
         </p:nvPicPr>
         <p:blipFill>
-          <a:blip r:embed="rId2"/>
+          <a:blip r:embed="rId3"/>
           <a:stretch>
             <a:fillRect/>
           </a:stretch>
@@ -4819,7 +6693,7 @@
           <p:nvPr/>
         </p:nvPicPr>
         <p:blipFill>
-          <a:blip r:embed="rId2"/>
+          <a:blip r:embed="rId3"/>
           <a:stretch>
             <a:fillRect/>
           </a:stretch>
@@ -5025,7 +6899,7 @@
           <p:nvPr/>
         </p:nvPicPr>
         <p:blipFill>
-          <a:blip r:embed="rId2"/>
+          <a:blip r:embed="rId3"/>
           <a:srcRect/>
           <a:stretch/>
         </p:blipFill>
@@ -5135,7 +7009,7 @@
           <p:nvPr/>
         </p:nvPicPr>
         <p:blipFill>
-          <a:blip r:embed="rId2"/>
+          <a:blip r:embed="rId3"/>
           <a:stretch>
             <a:fillRect/>
           </a:stretch>
@@ -5621,7 +7495,7 @@
           <p:nvPr/>
         </p:nvPicPr>
         <p:blipFill>
-          <a:blip r:embed="rId2"/>
+          <a:blip r:embed="rId3"/>
           <a:stretch>
             <a:fillRect/>
           </a:stretch>
@@ -5794,7 +7668,7 @@
           <p:nvPr/>
         </p:nvPicPr>
         <p:blipFill>
-          <a:blip r:embed="rId2"/>
+          <a:blip r:embed="rId3"/>
           <a:stretch>
             <a:fillRect/>
           </a:stretch>
@@ -5897,7 +7771,7 @@
           <p:nvPr/>
         </p:nvPicPr>
         <p:blipFill rotWithShape="1">
-          <a:blip r:embed="rId2"/>
+          <a:blip r:embed="rId3"/>
           <a:srcRect t="2746"/>
           <a:stretch/>
         </p:blipFill>
@@ -6039,7 +7913,7 @@
           <p:nvPr/>
         </p:nvPicPr>
         <p:blipFill rotWithShape="1">
-          <a:blip r:embed="rId2"/>
+          <a:blip r:embed="rId3"/>
           <a:srcRect t="2746"/>
           <a:stretch/>
         </p:blipFill>
@@ -6249,7 +8123,7 @@
           <p:nvPr/>
         </p:nvPicPr>
         <p:blipFill>
-          <a:blip r:embed="rId2"/>
+          <a:blip r:embed="rId3"/>
           <a:srcRect/>
           <a:stretch/>
         </p:blipFill>
@@ -6363,7 +8237,7 @@
           <p:nvPr/>
         </p:nvPicPr>
         <p:blipFill>
-          <a:blip r:embed="rId2"/>
+          <a:blip r:embed="rId3"/>
           <a:srcRect/>
           <a:stretch/>
         </p:blipFill>
@@ -6477,7 +8351,7 @@
           <p:nvPr/>
         </p:nvPicPr>
         <p:blipFill>
-          <a:blip r:embed="rId2"/>
+          <a:blip r:embed="rId3"/>
           <a:srcRect/>
           <a:stretch/>
         </p:blipFill>
@@ -6829,4 +8703,319 @@
     </a:ext>
   </a:extLst>
 </a:theme>
+</file>
+
+<file path=ppt/theme/theme2.xml><?xml version="1.0" encoding="utf-8"?>
+<a:theme xmlns:a="http://schemas.openxmlformats.org/drawingml/2006/main" name="Tema do Office">
+  <a:themeElements>
+    <a:clrScheme name="Office">
+      <a:dk1>
+        <a:sysClr val="windowText" lastClr="000000"/>
+      </a:dk1>
+      <a:lt1>
+        <a:sysClr val="window" lastClr="FFFFFF"/>
+      </a:lt1>
+      <a:dk2>
+        <a:srgbClr val="0E2841"/>
+      </a:dk2>
+      <a:lt2>
+        <a:srgbClr val="E8E8E8"/>
+      </a:lt2>
+      <a:accent1>
+        <a:srgbClr val="156082"/>
+      </a:accent1>
+      <a:accent2>
+        <a:srgbClr val="E97132"/>
+      </a:accent2>
+      <a:accent3>
+        <a:srgbClr val="196B24"/>
+      </a:accent3>
+      <a:accent4>
+        <a:srgbClr val="0F9ED5"/>
+      </a:accent4>
+      <a:accent5>
+        <a:srgbClr val="A02B93"/>
+      </a:accent5>
+      <a:accent6>
+        <a:srgbClr val="4EA72E"/>
+      </a:accent6>
+      <a:hlink>
+        <a:srgbClr val="467886"/>
+      </a:hlink>
+      <a:folHlink>
+        <a:srgbClr val="96607D"/>
+      </a:folHlink>
+    </a:clrScheme>
+    <a:fontScheme name="Office">
+      <a:majorFont>
+        <a:latin typeface="Aptos Display" panose="02110004020202020204"/>
+        <a:ea typeface=""/>
+        <a:cs typeface=""/>
+        <a:font script="Jpan" typeface="游ゴシック Light"/>
+        <a:font script="Hang" typeface="맑은 고딕"/>
+        <a:font script="Hans" typeface="等线 Light"/>
+        <a:font script="Hant" typeface="新細明體"/>
+        <a:font script="Arab" typeface="Times New Roman"/>
+        <a:font script="Hebr" typeface="Times New Roman"/>
+        <a:font script="Thai" typeface="Angsana New"/>
+        <a:font script="Ethi" typeface="Nyala"/>
+        <a:font script="Beng" typeface="Vrinda"/>
+        <a:font script="Gujr" typeface="Shruti"/>
+        <a:font script="Khmr" typeface="MoolBoran"/>
+        <a:font script="Knda" typeface="Tunga"/>
+        <a:font script="Guru" typeface="Raavi"/>
+        <a:font script="Cans" typeface="Euphemia"/>
+        <a:font script="Cher" typeface="Plantagenet Cherokee"/>
+        <a:font script="Yiii" typeface="Microsoft Yi Baiti"/>
+        <a:font script="Tibt" typeface="Microsoft Himalaya"/>
+        <a:font script="Thaa" typeface="MV Boli"/>
+        <a:font script="Deva" typeface="Mangal"/>
+        <a:font script="Telu" typeface="Gautami"/>
+        <a:font script="Taml" typeface="Latha"/>
+        <a:font script="Syrc" typeface="Estrangelo Edessa"/>
+        <a:font script="Orya" typeface="Kalinga"/>
+        <a:font script="Mlym" typeface="Kartika"/>
+        <a:font script="Laoo" typeface="DokChampa"/>
+        <a:font script="Sinh" typeface="Iskoola Pota"/>
+        <a:font script="Mong" typeface="Mongolian Baiti"/>
+        <a:font script="Viet" typeface="Times New Roman"/>
+        <a:font script="Uigh" typeface="Microsoft Uighur"/>
+        <a:font script="Geor" typeface="Sylfaen"/>
+        <a:font script="Armn" typeface="Arial"/>
+        <a:font script="Bugi" typeface="Leelawadee UI"/>
+        <a:font script="Bopo" typeface="Microsoft JhengHei"/>
+        <a:font script="Java" typeface="Javanese Text"/>
+        <a:font script="Lisu" typeface="Segoe UI"/>
+        <a:font script="Mymr" typeface="Myanmar Text"/>
+        <a:font script="Nkoo" typeface="Ebrima"/>
+        <a:font script="Olck" typeface="Nirmala UI"/>
+        <a:font script="Osma" typeface="Ebrima"/>
+        <a:font script="Phag" typeface="Phagspa"/>
+        <a:font script="Syrn" typeface="Estrangelo Edessa"/>
+        <a:font script="Syrj" typeface="Estrangelo Edessa"/>
+        <a:font script="Syre" typeface="Estrangelo Edessa"/>
+        <a:font script="Sora" typeface="Nirmala UI"/>
+        <a:font script="Tale" typeface="Microsoft Tai Le"/>
+        <a:font script="Talu" typeface="Microsoft New Tai Lue"/>
+        <a:font script="Tfng" typeface="Ebrima"/>
+      </a:majorFont>
+      <a:minorFont>
+        <a:latin typeface="Aptos" panose="02110004020202020204"/>
+        <a:ea typeface=""/>
+        <a:cs typeface=""/>
+        <a:font script="Jpan" typeface="游ゴシック"/>
+        <a:font script="Hang" typeface="맑은 고딕"/>
+        <a:font script="Hans" typeface="等线"/>
+        <a:font script="Hant" typeface="新細明體"/>
+        <a:font script="Arab" typeface="Arial"/>
+        <a:font script="Hebr" typeface="Arial"/>
+        <a:font script="Thai" typeface="Cordia New"/>
+        <a:font script="Ethi" typeface="Nyala"/>
+        <a:font script="Beng" typeface="Vrinda"/>
+        <a:font script="Gujr" typeface="Shruti"/>
+        <a:font script="Khmr" typeface="DaunPenh"/>
+        <a:font script="Knda" typeface="Tunga"/>
+        <a:font script="Guru" typeface="Raavi"/>
+        <a:font script="Cans" typeface="Euphemia"/>
+        <a:font script="Cher" typeface="Plantagenet Cherokee"/>
+        <a:font script="Yiii" typeface="Microsoft Yi Baiti"/>
+        <a:font script="Tibt" typeface="Microsoft Himalaya"/>
+        <a:font script="Thaa" typeface="MV Boli"/>
+        <a:font script="Deva" typeface="Mangal"/>
+        <a:font script="Telu" typeface="Gautami"/>
+        <a:font script="Taml" typeface="Latha"/>
+        <a:font script="Syrc" typeface="Estrangelo Edessa"/>
+        <a:font script="Orya" typeface="Kalinga"/>
+        <a:font script="Mlym" typeface="Kartika"/>
+        <a:font script="Laoo" typeface="DokChampa"/>
+        <a:font script="Sinh" typeface="Iskoola Pota"/>
+        <a:font script="Mong" typeface="Mongolian Baiti"/>
+        <a:font script="Viet" typeface="Arial"/>
+        <a:font script="Uigh" typeface="Microsoft Uighur"/>
+        <a:font script="Geor" typeface="Sylfaen"/>
+        <a:font script="Armn" typeface="Arial"/>
+        <a:font script="Bugi" typeface="Leelawadee UI"/>
+        <a:font script="Bopo" typeface="Microsoft JhengHei"/>
+        <a:font script="Java" typeface="Javanese Text"/>
+        <a:font script="Lisu" typeface="Segoe UI"/>
+        <a:font script="Mymr" typeface="Myanmar Text"/>
+        <a:font script="Nkoo" typeface="Ebrima"/>
+        <a:font script="Olck" typeface="Nirmala UI"/>
+        <a:font script="Osma" typeface="Ebrima"/>
+        <a:font script="Phag" typeface="Phagspa"/>
+        <a:font script="Syrn" typeface="Estrangelo Edessa"/>
+        <a:font script="Syrj" typeface="Estrangelo Edessa"/>
+        <a:font script="Syre" typeface="Estrangelo Edessa"/>
+        <a:font script="Sora" typeface="Nirmala UI"/>
+        <a:font script="Tale" typeface="Microsoft Tai Le"/>
+        <a:font script="Talu" typeface="Microsoft New Tai Lue"/>
+        <a:font script="Tfng" typeface="Ebrima"/>
+      </a:minorFont>
+    </a:fontScheme>
+    <a:fmtScheme name="Office">
+      <a:fillStyleLst>
+        <a:solidFill>
+          <a:schemeClr val="phClr"/>
+        </a:solidFill>
+        <a:gradFill rotWithShape="1">
+          <a:gsLst>
+            <a:gs pos="0">
+              <a:schemeClr val="phClr">
+                <a:lumMod val="110000"/>
+                <a:satMod val="105000"/>
+                <a:tint val="67000"/>
+              </a:schemeClr>
+            </a:gs>
+            <a:gs pos="50000">
+              <a:schemeClr val="phClr">
+                <a:lumMod val="105000"/>
+                <a:satMod val="103000"/>
+                <a:tint val="73000"/>
+              </a:schemeClr>
+            </a:gs>
+            <a:gs pos="100000">
+              <a:schemeClr val="phClr">
+                <a:lumMod val="105000"/>
+                <a:satMod val="109000"/>
+                <a:tint val="81000"/>
+              </a:schemeClr>
+            </a:gs>
+          </a:gsLst>
+          <a:lin ang="5400000" scaled="0"/>
+        </a:gradFill>
+        <a:gradFill rotWithShape="1">
+          <a:gsLst>
+            <a:gs pos="0">
+              <a:schemeClr val="phClr">
+                <a:satMod val="103000"/>
+                <a:lumMod val="102000"/>
+                <a:tint val="94000"/>
+              </a:schemeClr>
+            </a:gs>
+            <a:gs pos="50000">
+              <a:schemeClr val="phClr">
+                <a:satMod val="110000"/>
+                <a:lumMod val="100000"/>
+                <a:shade val="100000"/>
+              </a:schemeClr>
+            </a:gs>
+            <a:gs pos="100000">
+              <a:schemeClr val="phClr">
+                <a:lumMod val="99000"/>
+                <a:satMod val="120000"/>
+                <a:shade val="78000"/>
+              </a:schemeClr>
+            </a:gs>
+          </a:gsLst>
+          <a:lin ang="5400000" scaled="0"/>
+        </a:gradFill>
+      </a:fillStyleLst>
+      <a:lnStyleLst>
+        <a:ln w="12700" cap="flat" cmpd="sng" algn="ctr">
+          <a:solidFill>
+            <a:schemeClr val="phClr"/>
+          </a:solidFill>
+          <a:prstDash val="solid"/>
+          <a:miter lim="800000"/>
+        </a:ln>
+        <a:ln w="19050" cap="flat" cmpd="sng" algn="ctr">
+          <a:solidFill>
+            <a:schemeClr val="phClr"/>
+          </a:solidFill>
+          <a:prstDash val="solid"/>
+          <a:miter lim="800000"/>
+        </a:ln>
+        <a:ln w="25400" cap="flat" cmpd="sng" algn="ctr">
+          <a:solidFill>
+            <a:schemeClr val="phClr"/>
+          </a:solidFill>
+          <a:prstDash val="solid"/>
+          <a:miter lim="800000"/>
+        </a:ln>
+      </a:lnStyleLst>
+      <a:effectStyleLst>
+        <a:effectStyle>
+          <a:effectLst/>
+        </a:effectStyle>
+        <a:effectStyle>
+          <a:effectLst/>
+        </a:effectStyle>
+        <a:effectStyle>
+          <a:effectLst>
+            <a:outerShdw blurRad="57150" dist="19050" dir="5400000" algn="ctr" rotWithShape="0">
+              <a:srgbClr val="000000">
+                <a:alpha val="63000"/>
+              </a:srgbClr>
+            </a:outerShdw>
+          </a:effectLst>
+        </a:effectStyle>
+      </a:effectStyleLst>
+      <a:bgFillStyleLst>
+        <a:solidFill>
+          <a:schemeClr val="phClr"/>
+        </a:solidFill>
+        <a:solidFill>
+          <a:schemeClr val="phClr">
+            <a:tint val="95000"/>
+            <a:satMod val="170000"/>
+          </a:schemeClr>
+        </a:solidFill>
+        <a:gradFill rotWithShape="1">
+          <a:gsLst>
+            <a:gs pos="0">
+              <a:schemeClr val="phClr">
+                <a:tint val="93000"/>
+                <a:satMod val="150000"/>
+                <a:shade val="98000"/>
+                <a:lumMod val="102000"/>
+              </a:schemeClr>
+            </a:gs>
+            <a:gs pos="50000">
+              <a:schemeClr val="phClr">
+                <a:tint val="98000"/>
+                <a:satMod val="130000"/>
+                <a:shade val="90000"/>
+                <a:lumMod val="103000"/>
+              </a:schemeClr>
+            </a:gs>
+            <a:gs pos="100000">
+              <a:schemeClr val="phClr">
+                <a:shade val="63000"/>
+                <a:satMod val="120000"/>
+              </a:schemeClr>
+            </a:gs>
+          </a:gsLst>
+          <a:lin ang="5400000" scaled="0"/>
+        </a:gradFill>
+      </a:bgFillStyleLst>
+    </a:fmtScheme>
+  </a:themeElements>
+  <a:objectDefaults>
+    <a:lnDef>
+      <a:spPr/>
+      <a:bodyPr/>
+      <a:lstStyle/>
+      <a:style>
+        <a:lnRef idx="2">
+          <a:schemeClr val="accent1"/>
+        </a:lnRef>
+        <a:fillRef idx="0">
+          <a:schemeClr val="accent1"/>
+        </a:fillRef>
+        <a:effectRef idx="1">
+          <a:schemeClr val="accent1"/>
+        </a:effectRef>
+        <a:fontRef idx="minor">
+          <a:schemeClr val="tx1"/>
+        </a:fontRef>
+      </a:style>
+    </a:lnDef>
+  </a:objectDefaults>
+  <a:extraClrSchemeLst/>
+  <a:extLst>
+    <a:ext uri="{05A4C25C-085E-4340-85A3-A5531E510DB2}">
+      <thm15:themeFamily xmlns:thm15="http://schemas.microsoft.com/office/thememl/2012/main" name="Office Theme" id="{2E142A2C-CD16-42D6-873A-C26D2A0506FA}" vid="{1BDDFF52-6CD6-40A5-AB3C-68EB2F1E4D0A}"/>
+    </a:ext>
+  </a:extLst>
+</a:theme>
 </file>
</xml_diff>